<commit_message>
cleanup images in website
</commit_message>
<xml_diff>
--- a/documents/design/webportal/Web Portal Design Graphics.pptx
+++ b/documents/design/webportal/Web Portal Design Graphics.pptx
@@ -198,7 +198,7 @@
           <a:p>
             <a:fld id="{ABBC0DEB-B0BC-4CA7-A885-C7D164CEF9CA}" type="datetimeFigureOut">
               <a:rPr lang="en-US" smtClean="0"/>
-              <a:t>2/18/2012</a:t>
+              <a:t>2/22/2012</a:t>
             </a:fld>
             <a:endParaRPr lang="en-US"/>
           </a:p>
@@ -731,7 +731,7 @@
           <a:p>
             <a:fld id="{EEED50E4-BD2F-46D6-A43A-366B2EDD972C}" type="datetimeFigureOut">
               <a:rPr lang="en-US" smtClean="0"/>
-              <a:t>2/18/2012</a:t>
+              <a:t>2/22/2012</a:t>
             </a:fld>
             <a:endParaRPr lang="en-US"/>
           </a:p>
@@ -901,7 +901,7 @@
           <a:p>
             <a:fld id="{EEED50E4-BD2F-46D6-A43A-366B2EDD972C}" type="datetimeFigureOut">
               <a:rPr lang="en-US" smtClean="0"/>
-              <a:t>2/18/2012</a:t>
+              <a:t>2/22/2012</a:t>
             </a:fld>
             <a:endParaRPr lang="en-US"/>
           </a:p>
@@ -1081,7 +1081,7 @@
           <a:p>
             <a:fld id="{EEED50E4-BD2F-46D6-A43A-366B2EDD972C}" type="datetimeFigureOut">
               <a:rPr lang="en-US" smtClean="0"/>
-              <a:t>2/18/2012</a:t>
+              <a:t>2/22/2012</a:t>
             </a:fld>
             <a:endParaRPr lang="en-US"/>
           </a:p>
@@ -1251,7 +1251,7 @@
           <a:p>
             <a:fld id="{EEED50E4-BD2F-46D6-A43A-366B2EDD972C}" type="datetimeFigureOut">
               <a:rPr lang="en-US" smtClean="0"/>
-              <a:t>2/18/2012</a:t>
+              <a:t>2/22/2012</a:t>
             </a:fld>
             <a:endParaRPr lang="en-US"/>
           </a:p>
@@ -1497,7 +1497,7 @@
           <a:p>
             <a:fld id="{EEED50E4-BD2F-46D6-A43A-366B2EDD972C}" type="datetimeFigureOut">
               <a:rPr lang="en-US" smtClean="0"/>
-              <a:t>2/18/2012</a:t>
+              <a:t>2/22/2012</a:t>
             </a:fld>
             <a:endParaRPr lang="en-US"/>
           </a:p>
@@ -1785,7 +1785,7 @@
           <a:p>
             <a:fld id="{EEED50E4-BD2F-46D6-A43A-366B2EDD972C}" type="datetimeFigureOut">
               <a:rPr lang="en-US" smtClean="0"/>
-              <a:t>2/18/2012</a:t>
+              <a:t>2/22/2012</a:t>
             </a:fld>
             <a:endParaRPr lang="en-US"/>
           </a:p>
@@ -2207,7 +2207,7 @@
           <a:p>
             <a:fld id="{EEED50E4-BD2F-46D6-A43A-366B2EDD972C}" type="datetimeFigureOut">
               <a:rPr lang="en-US" smtClean="0"/>
-              <a:t>2/18/2012</a:t>
+              <a:t>2/22/2012</a:t>
             </a:fld>
             <a:endParaRPr lang="en-US"/>
           </a:p>
@@ -2325,7 +2325,7 @@
           <a:p>
             <a:fld id="{EEED50E4-BD2F-46D6-A43A-366B2EDD972C}" type="datetimeFigureOut">
               <a:rPr lang="en-US" smtClean="0"/>
-              <a:t>2/18/2012</a:t>
+              <a:t>2/22/2012</a:t>
             </a:fld>
             <a:endParaRPr lang="en-US"/>
           </a:p>
@@ -2420,7 +2420,7 @@
           <a:p>
             <a:fld id="{EEED50E4-BD2F-46D6-A43A-366B2EDD972C}" type="datetimeFigureOut">
               <a:rPr lang="en-US" smtClean="0"/>
-              <a:t>2/18/2012</a:t>
+              <a:t>2/22/2012</a:t>
             </a:fld>
             <a:endParaRPr lang="en-US"/>
           </a:p>
@@ -2697,7 +2697,7 @@
           <a:p>
             <a:fld id="{EEED50E4-BD2F-46D6-A43A-366B2EDD972C}" type="datetimeFigureOut">
               <a:rPr lang="en-US" smtClean="0"/>
-              <a:t>2/18/2012</a:t>
+              <a:t>2/22/2012</a:t>
             </a:fld>
             <a:endParaRPr lang="en-US"/>
           </a:p>
@@ -2950,7 +2950,7 @@
           <a:p>
             <a:fld id="{EEED50E4-BD2F-46D6-A43A-366B2EDD972C}" type="datetimeFigureOut">
               <a:rPr lang="en-US" smtClean="0"/>
-              <a:t>2/18/2012</a:t>
+              <a:t>2/22/2012</a:t>
             </a:fld>
             <a:endParaRPr lang="en-US"/>
           </a:p>
@@ -3166,7 +3166,7 @@
           <a:p>
             <a:fld id="{EEED50E4-BD2F-46D6-A43A-366B2EDD972C}" type="datetimeFigureOut">
               <a:rPr lang="en-US" smtClean="0"/>
-              <a:t>2/18/2012</a:t>
+              <a:t>2/22/2012</a:t>
             </a:fld>
             <a:endParaRPr lang="en-US"/>
           </a:p>
@@ -11952,6 +11952,108 @@
       </p:grpSpPr>
       <p:sp>
         <p:nvSpPr>
+          <p:cNvPr id="63" name="Rounded Rectangle 62"/>
+          <p:cNvSpPr/>
+          <p:nvPr/>
+        </p:nvSpPr>
+        <p:spPr>
+          <a:xfrm>
+            <a:off x="304800" y="1937716"/>
+            <a:ext cx="152400" cy="9950"/>
+          </a:xfrm>
+          <a:prstGeom prst="roundRect">
+            <a:avLst>
+              <a:gd name="adj" fmla="val 0"/>
+            </a:avLst>
+          </a:prstGeom>
+          <a:solidFill>
+            <a:srgbClr val="E8EEF0"/>
+          </a:solidFill>
+          <a:ln w="31750" cmpd="sng">
+            <a:noFill/>
+            <a:prstDash val="solid"/>
+            <a:round/>
+          </a:ln>
+          <a:effectLst/>
+        </p:spPr>
+        <p:style>
+          <a:lnRef idx="2">
+            <a:schemeClr val="accent1">
+              <a:shade val="50000"/>
+            </a:schemeClr>
+          </a:lnRef>
+          <a:fillRef idx="1">
+            <a:schemeClr val="accent1"/>
+          </a:fillRef>
+          <a:effectRef idx="0">
+            <a:schemeClr val="accent1"/>
+          </a:effectRef>
+          <a:fontRef idx="minor">
+            <a:schemeClr val="lt1"/>
+          </a:fontRef>
+        </p:style>
+        <p:txBody>
+          <a:bodyPr rtlCol="0" anchor="ctr"/>
+          <a:lstStyle/>
+          <a:p>
+            <a:pPr algn="ctr"/>
+            <a:endParaRPr lang="en-US"/>
+          </a:p>
+        </p:txBody>
+      </p:sp>
+      <p:sp>
+        <p:nvSpPr>
+          <p:cNvPr id="67" name="Rounded Rectangle 66"/>
+          <p:cNvSpPr/>
+          <p:nvPr/>
+        </p:nvSpPr>
+        <p:spPr>
+          <a:xfrm>
+            <a:off x="304800" y="1312599"/>
+            <a:ext cx="152400" cy="627017"/>
+          </a:xfrm>
+          <a:prstGeom prst="roundRect">
+            <a:avLst>
+              <a:gd name="adj" fmla="val 0"/>
+            </a:avLst>
+          </a:prstGeom>
+          <a:solidFill>
+            <a:srgbClr val="AEC2D0"/>
+          </a:solidFill>
+          <a:ln w="31750" cmpd="sng">
+            <a:noFill/>
+            <a:prstDash val="solid"/>
+            <a:round/>
+          </a:ln>
+          <a:effectLst/>
+        </p:spPr>
+        <p:style>
+          <a:lnRef idx="2">
+            <a:schemeClr val="accent1">
+              <a:shade val="50000"/>
+            </a:schemeClr>
+          </a:lnRef>
+          <a:fillRef idx="1">
+            <a:schemeClr val="accent1"/>
+          </a:fillRef>
+          <a:effectRef idx="0">
+            <a:schemeClr val="accent1"/>
+          </a:effectRef>
+          <a:fontRef idx="minor">
+            <a:schemeClr val="lt1"/>
+          </a:fontRef>
+        </p:style>
+        <p:txBody>
+          <a:bodyPr rtlCol="0" anchor="ctr"/>
+          <a:lstStyle/>
+          <a:p>
+            <a:pPr algn="ctr"/>
+            <a:endParaRPr lang="en-US"/>
+          </a:p>
+        </p:txBody>
+      </p:sp>
+      <p:sp>
+        <p:nvSpPr>
           <p:cNvPr id="116" name="Rectangle 115"/>
           <p:cNvSpPr/>
           <p:nvPr/>
@@ -14256,13 +14358,64 @@
       </p:sp>
       <p:sp>
         <p:nvSpPr>
-          <p:cNvPr id="67" name="Rounded Rectangle 66"/>
+          <p:cNvPr id="62" name="Rounded Rectangle 61"/>
           <p:cNvSpPr/>
           <p:nvPr/>
         </p:nvSpPr>
         <p:spPr>
           <a:xfrm>
-            <a:off x="0" y="0"/>
+            <a:off x="304800" y="1946599"/>
+            <a:ext cx="152400" cy="5105"/>
+          </a:xfrm>
+          <a:prstGeom prst="roundRect">
+            <a:avLst>
+              <a:gd name="adj" fmla="val 0"/>
+            </a:avLst>
+          </a:prstGeom>
+          <a:solidFill>
+            <a:srgbClr val="4172AD"/>
+          </a:solidFill>
+          <a:ln w="31750" cmpd="sng">
+            <a:noFill/>
+            <a:prstDash val="solid"/>
+            <a:round/>
+          </a:ln>
+          <a:effectLst/>
+        </p:spPr>
+        <p:style>
+          <a:lnRef idx="2">
+            <a:schemeClr val="accent1">
+              <a:shade val="50000"/>
+            </a:schemeClr>
+          </a:lnRef>
+          <a:fillRef idx="1">
+            <a:schemeClr val="accent1"/>
+          </a:fillRef>
+          <a:effectRef idx="0">
+            <a:schemeClr val="accent1"/>
+          </a:effectRef>
+          <a:fontRef idx="minor">
+            <a:schemeClr val="lt1"/>
+          </a:fontRef>
+        </p:style>
+        <p:txBody>
+          <a:bodyPr rtlCol="0" anchor="ctr"/>
+          <a:lstStyle/>
+          <a:p>
+            <a:pPr algn="ctr"/>
+            <a:endParaRPr lang="en-US"/>
+          </a:p>
+        </p:txBody>
+      </p:sp>
+      <p:sp>
+        <p:nvSpPr>
+          <p:cNvPr id="64" name="Rounded Rectangle 63"/>
+          <p:cNvSpPr/>
+          <p:nvPr/>
+        </p:nvSpPr>
+        <p:spPr>
+          <a:xfrm>
+            <a:off x="304800" y="442708"/>
             <a:ext cx="685800" cy="627017"/>
           </a:xfrm>
           <a:prstGeom prst="roundRect">
@@ -14280,11 +14433,113 @@
           </a:ln>
           <a:effectLst>
             <a:outerShdw blurRad="63500" dist="38100" dir="5400000" algn="t" rotWithShape="0">
-              <a:schemeClr val="tx2">
+              <a:srgbClr val="4172AD">
                 <a:alpha val="40000"/>
-              </a:schemeClr>
+              </a:srgbClr>
             </a:outerShdw>
           </a:effectLst>
+        </p:spPr>
+        <p:style>
+          <a:lnRef idx="2">
+            <a:schemeClr val="accent1">
+              <a:shade val="50000"/>
+            </a:schemeClr>
+          </a:lnRef>
+          <a:fillRef idx="1">
+            <a:schemeClr val="accent1"/>
+          </a:fillRef>
+          <a:effectRef idx="0">
+            <a:schemeClr val="accent1"/>
+          </a:effectRef>
+          <a:fontRef idx="minor">
+            <a:schemeClr val="lt1"/>
+          </a:fontRef>
+        </p:style>
+        <p:txBody>
+          <a:bodyPr rtlCol="0" anchor="ctr"/>
+          <a:lstStyle/>
+          <a:p>
+            <a:pPr algn="ctr"/>
+            <a:endParaRPr lang="en-US"/>
+          </a:p>
+        </p:txBody>
+      </p:sp>
+      <p:sp>
+        <p:nvSpPr>
+          <p:cNvPr id="65" name="Rounded Rectangle 64"/>
+          <p:cNvSpPr/>
+          <p:nvPr/>
+        </p:nvSpPr>
+        <p:spPr>
+          <a:xfrm>
+            <a:off x="304800" y="1307624"/>
+            <a:ext cx="152400" cy="9950"/>
+          </a:xfrm>
+          <a:prstGeom prst="roundRect">
+            <a:avLst>
+              <a:gd name="adj" fmla="val 0"/>
+            </a:avLst>
+          </a:prstGeom>
+          <a:solidFill>
+            <a:srgbClr val="E8EEF0"/>
+          </a:solidFill>
+          <a:ln w="31750" cmpd="sng">
+            <a:noFill/>
+            <a:prstDash val="solid"/>
+            <a:round/>
+          </a:ln>
+          <a:effectLst/>
+        </p:spPr>
+        <p:style>
+          <a:lnRef idx="2">
+            <a:schemeClr val="accent1">
+              <a:shade val="50000"/>
+            </a:schemeClr>
+          </a:lnRef>
+          <a:fillRef idx="1">
+            <a:schemeClr val="accent1"/>
+          </a:fillRef>
+          <a:effectRef idx="0">
+            <a:schemeClr val="accent1"/>
+          </a:effectRef>
+          <a:fontRef idx="minor">
+            <a:schemeClr val="lt1"/>
+          </a:fontRef>
+        </p:style>
+        <p:txBody>
+          <a:bodyPr rtlCol="0" anchor="ctr"/>
+          <a:lstStyle/>
+          <a:p>
+            <a:pPr algn="ctr"/>
+            <a:endParaRPr lang="en-US"/>
+          </a:p>
+        </p:txBody>
+      </p:sp>
+      <p:sp>
+        <p:nvSpPr>
+          <p:cNvPr id="66" name="Rounded Rectangle 65"/>
+          <p:cNvSpPr/>
+          <p:nvPr/>
+        </p:nvSpPr>
+        <p:spPr>
+          <a:xfrm>
+            <a:off x="304800" y="1305071"/>
+            <a:ext cx="152400" cy="5105"/>
+          </a:xfrm>
+          <a:prstGeom prst="roundRect">
+            <a:avLst>
+              <a:gd name="adj" fmla="val 0"/>
+            </a:avLst>
+          </a:prstGeom>
+          <a:solidFill>
+            <a:srgbClr val="4172AD"/>
+          </a:solidFill>
+          <a:ln w="31750" cmpd="sng">
+            <a:noFill/>
+            <a:prstDash val="solid"/>
+            <a:round/>
+          </a:ln>
+          <a:effectLst/>
         </p:spPr>
         <p:style>
           <a:lnRef idx="2">
@@ -14349,7 +14604,7 @@
         </p:nvSpPr>
         <p:spPr>
           <a:xfrm>
-            <a:off x="765279" y="304800"/>
+            <a:off x="812827" y="268961"/>
             <a:ext cx="3933962" cy="3431030"/>
           </a:xfrm>
           <a:prstGeom prst="roundRect">
@@ -14397,8 +14652,8 @@
         </p:nvSpPr>
         <p:spPr>
           <a:xfrm>
-            <a:off x="1179608" y="594020"/>
-            <a:ext cx="3200400" cy="2837010"/>
+            <a:off x="1186432" y="2514600"/>
+            <a:ext cx="3200400" cy="868680"/>
           </a:xfrm>
           <a:prstGeom prst="roundRect">
             <a:avLst>
@@ -14412,7 +14667,7 @@
             <a:noFill/>
           </a:ln>
           <a:effectLst>
-            <a:outerShdw blurRad="63500" dist="12700" dir="2700000" algn="ctr" rotWithShape="0">
+            <a:outerShdw blurRad="25400" dist="12700" dir="2700000" algn="ctr" rotWithShape="0">
               <a:schemeClr val="bg2">
                 <a:lumMod val="50000"/>
                 <a:alpha val="40000"/>

</xml_diff>

<commit_message>
defined default constants, default folders, website FolderList view
</commit_message>
<xml_diff>
--- a/documents/design/webportal/Web Portal Design Graphics.pptx
+++ b/documents/design/webportal/Web Portal Design Graphics.pptx
@@ -5,16 +5,17 @@
     <p:sldMasterId id="2147483648" r:id="rId1"/>
   </p:sldMasterIdLst>
   <p:notesMasterIdLst>
-    <p:notesMasterId r:id="rId9"/>
+    <p:notesMasterId r:id="rId10"/>
   </p:notesMasterIdLst>
   <p:sldIdLst>
-    <p:sldId id="256" r:id="rId2"/>
-    <p:sldId id="259" r:id="rId3"/>
-    <p:sldId id="260" r:id="rId4"/>
-    <p:sldId id="262" r:id="rId5"/>
-    <p:sldId id="264" r:id="rId6"/>
-    <p:sldId id="265" r:id="rId7"/>
-    <p:sldId id="263" r:id="rId8"/>
+    <p:sldId id="266" r:id="rId2"/>
+    <p:sldId id="256" r:id="rId3"/>
+    <p:sldId id="259" r:id="rId4"/>
+    <p:sldId id="260" r:id="rId5"/>
+    <p:sldId id="262" r:id="rId6"/>
+    <p:sldId id="264" r:id="rId7"/>
+    <p:sldId id="265" r:id="rId8"/>
+    <p:sldId id="263" r:id="rId9"/>
   </p:sldIdLst>
   <p:sldSz cx="9144000" cy="6858000" type="screen4x3"/>
   <p:notesSz cx="6858000" cy="9144000"/>
@@ -198,7 +199,7 @@
           <a:p>
             <a:fld id="{ABBC0DEB-B0BC-4CA7-A885-C7D164CEF9CA}" type="datetimeFigureOut">
               <a:rPr lang="en-US" smtClean="0"/>
-              <a:t>2/22/2012</a:t>
+              <a:t>2/24/2012</a:t>
             </a:fld>
             <a:endParaRPr lang="en-US"/>
           </a:p>
@@ -531,7 +532,7 @@
           <a:p>
             <a:fld id="{E09A9129-0AAA-418C-BAC9-61B57D0A0F98}" type="slidenum">
               <a:rPr lang="en-US" smtClean="0"/>
-              <a:t>1</a:t>
+              <a:t>2</a:t>
             </a:fld>
             <a:endParaRPr lang="en-US"/>
           </a:p>
@@ -731,7 +732,7 @@
           <a:p>
             <a:fld id="{EEED50E4-BD2F-46D6-A43A-366B2EDD972C}" type="datetimeFigureOut">
               <a:rPr lang="en-US" smtClean="0"/>
-              <a:t>2/22/2012</a:t>
+              <a:t>2/24/2012</a:t>
             </a:fld>
             <a:endParaRPr lang="en-US"/>
           </a:p>
@@ -901,7 +902,7 @@
           <a:p>
             <a:fld id="{EEED50E4-BD2F-46D6-A43A-366B2EDD972C}" type="datetimeFigureOut">
               <a:rPr lang="en-US" smtClean="0"/>
-              <a:t>2/22/2012</a:t>
+              <a:t>2/24/2012</a:t>
             </a:fld>
             <a:endParaRPr lang="en-US"/>
           </a:p>
@@ -1081,7 +1082,7 @@
           <a:p>
             <a:fld id="{EEED50E4-BD2F-46D6-A43A-366B2EDD972C}" type="datetimeFigureOut">
               <a:rPr lang="en-US" smtClean="0"/>
-              <a:t>2/22/2012</a:t>
+              <a:t>2/24/2012</a:t>
             </a:fld>
             <a:endParaRPr lang="en-US"/>
           </a:p>
@@ -1251,7 +1252,7 @@
           <a:p>
             <a:fld id="{EEED50E4-BD2F-46D6-A43A-366B2EDD972C}" type="datetimeFigureOut">
               <a:rPr lang="en-US" smtClean="0"/>
-              <a:t>2/22/2012</a:t>
+              <a:t>2/24/2012</a:t>
             </a:fld>
             <a:endParaRPr lang="en-US"/>
           </a:p>
@@ -1497,7 +1498,7 @@
           <a:p>
             <a:fld id="{EEED50E4-BD2F-46D6-A43A-366B2EDD972C}" type="datetimeFigureOut">
               <a:rPr lang="en-US" smtClean="0"/>
-              <a:t>2/22/2012</a:t>
+              <a:t>2/24/2012</a:t>
             </a:fld>
             <a:endParaRPr lang="en-US"/>
           </a:p>
@@ -1785,7 +1786,7 @@
           <a:p>
             <a:fld id="{EEED50E4-BD2F-46D6-A43A-366B2EDD972C}" type="datetimeFigureOut">
               <a:rPr lang="en-US" smtClean="0"/>
-              <a:t>2/22/2012</a:t>
+              <a:t>2/24/2012</a:t>
             </a:fld>
             <a:endParaRPr lang="en-US"/>
           </a:p>
@@ -2207,7 +2208,7 @@
           <a:p>
             <a:fld id="{EEED50E4-BD2F-46D6-A43A-366B2EDD972C}" type="datetimeFigureOut">
               <a:rPr lang="en-US" smtClean="0"/>
-              <a:t>2/22/2012</a:t>
+              <a:t>2/24/2012</a:t>
             </a:fld>
             <a:endParaRPr lang="en-US"/>
           </a:p>
@@ -2325,7 +2326,7 @@
           <a:p>
             <a:fld id="{EEED50E4-BD2F-46D6-A43A-366B2EDD972C}" type="datetimeFigureOut">
               <a:rPr lang="en-US" smtClean="0"/>
-              <a:t>2/22/2012</a:t>
+              <a:t>2/24/2012</a:t>
             </a:fld>
             <a:endParaRPr lang="en-US"/>
           </a:p>
@@ -2420,7 +2421,7 @@
           <a:p>
             <a:fld id="{EEED50E4-BD2F-46D6-A43A-366B2EDD972C}" type="datetimeFigureOut">
               <a:rPr lang="en-US" smtClean="0"/>
-              <a:t>2/22/2012</a:t>
+              <a:t>2/24/2012</a:t>
             </a:fld>
             <a:endParaRPr lang="en-US"/>
           </a:p>
@@ -2697,7 +2698,7 @@
           <a:p>
             <a:fld id="{EEED50E4-BD2F-46D6-A43A-366B2EDD972C}" type="datetimeFigureOut">
               <a:rPr lang="en-US" smtClean="0"/>
-              <a:t>2/22/2012</a:t>
+              <a:t>2/24/2012</a:t>
             </a:fld>
             <a:endParaRPr lang="en-US"/>
           </a:p>
@@ -2950,7 +2951,7 @@
           <a:p>
             <a:fld id="{EEED50E4-BD2F-46D6-A43A-366B2EDD972C}" type="datetimeFigureOut">
               <a:rPr lang="en-US" smtClean="0"/>
-              <a:t>2/22/2012</a:t>
+              <a:t>2/24/2012</a:t>
             </a:fld>
             <a:endParaRPr lang="en-US"/>
           </a:p>
@@ -3166,7 +3167,7 @@
           <a:p>
             <a:fld id="{EEED50E4-BD2F-46D6-A43A-366B2EDD972C}" type="datetimeFigureOut">
               <a:rPr lang="en-US" smtClean="0"/>
-              <a:t>2/22/2012</a:t>
+              <a:t>2/24/2012</a:t>
             </a:fld>
             <a:endParaRPr lang="en-US"/>
           </a:p>
@@ -3527,6 +3528,614 @@
 <file path=ppt/slides/slide1.xml><?xml version="1.0" encoding="utf-8"?>
 <p:sld xmlns:a="http://schemas.openxmlformats.org/drawingml/2006/main" xmlns:r="http://schemas.openxmlformats.org/officeDocument/2006/relationships" xmlns:p="http://schemas.openxmlformats.org/presentationml/2006/main">
   <p:cSld>
+    <p:bg>
+      <p:bgPr>
+        <a:solidFill>
+          <a:schemeClr val="bg1"/>
+        </a:solidFill>
+        <a:effectLst/>
+      </p:bgPr>
+    </p:bg>
+    <p:spTree>
+      <p:nvGrpSpPr>
+        <p:cNvPr id="1" name=""/>
+        <p:cNvGrpSpPr/>
+        <p:nvPr/>
+      </p:nvGrpSpPr>
+      <p:grpSpPr>
+        <a:xfrm>
+          <a:off x="0" y="0"/>
+          <a:ext cx="0" cy="0"/>
+          <a:chOff x="0" y="0"/>
+          <a:chExt cx="0" cy="0"/>
+        </a:xfrm>
+      </p:grpSpPr>
+      <p:sp>
+        <p:nvSpPr>
+          <p:cNvPr id="2" name="Rounded Rectangle 1"/>
+          <p:cNvSpPr/>
+          <p:nvPr/>
+        </p:nvSpPr>
+        <p:spPr>
+          <a:xfrm>
+            <a:off x="381000" y="304800"/>
+            <a:ext cx="1828800" cy="457200"/>
+          </a:xfrm>
+          <a:prstGeom prst="roundRect">
+            <a:avLst/>
+          </a:prstGeom>
+          <a:solidFill>
+            <a:srgbClr val="EEECE1"/>
+          </a:solidFill>
+          <a:ln>
+            <a:noFill/>
+          </a:ln>
+        </p:spPr>
+        <p:style>
+          <a:lnRef idx="2">
+            <a:schemeClr val="accent1">
+              <a:shade val="50000"/>
+            </a:schemeClr>
+          </a:lnRef>
+          <a:fillRef idx="1">
+            <a:schemeClr val="accent1"/>
+          </a:fillRef>
+          <a:effectRef idx="0">
+            <a:schemeClr val="accent1"/>
+          </a:effectRef>
+          <a:fontRef idx="minor">
+            <a:schemeClr val="lt1"/>
+          </a:fontRef>
+        </p:style>
+        <p:txBody>
+          <a:bodyPr rtlCol="0" anchor="ctr"/>
+          <a:lstStyle/>
+          <a:p>
+            <a:pPr algn="ctr"/>
+            <a:r>
+              <a:rPr lang="en-US" dirty="0" smtClean="0">
+                <a:solidFill>
+                  <a:schemeClr val="tx1"/>
+                </a:solidFill>
+              </a:rPr>
+              <a:t>#EEECE1</a:t>
+            </a:r>
+            <a:endParaRPr lang="en-US" dirty="0">
+              <a:solidFill>
+                <a:schemeClr val="tx1"/>
+              </a:solidFill>
+            </a:endParaRPr>
+          </a:p>
+        </p:txBody>
+      </p:sp>
+      <p:sp>
+        <p:nvSpPr>
+          <p:cNvPr id="3" name="Rounded Rectangle 2"/>
+          <p:cNvSpPr/>
+          <p:nvPr/>
+        </p:nvSpPr>
+        <p:spPr>
+          <a:xfrm>
+            <a:off x="393192" y="914400"/>
+            <a:ext cx="1828800" cy="457200"/>
+          </a:xfrm>
+          <a:prstGeom prst="roundRect">
+            <a:avLst/>
+          </a:prstGeom>
+          <a:solidFill>
+            <a:srgbClr val="DDD9C3"/>
+          </a:solidFill>
+          <a:ln>
+            <a:noFill/>
+          </a:ln>
+        </p:spPr>
+        <p:style>
+          <a:lnRef idx="2">
+            <a:schemeClr val="accent1">
+              <a:shade val="50000"/>
+            </a:schemeClr>
+          </a:lnRef>
+          <a:fillRef idx="1">
+            <a:schemeClr val="accent1"/>
+          </a:fillRef>
+          <a:effectRef idx="0">
+            <a:schemeClr val="accent1"/>
+          </a:effectRef>
+          <a:fontRef idx="minor">
+            <a:schemeClr val="lt1"/>
+          </a:fontRef>
+        </p:style>
+        <p:txBody>
+          <a:bodyPr rtlCol="0" anchor="ctr"/>
+          <a:lstStyle/>
+          <a:p>
+            <a:pPr algn="ctr"/>
+            <a:r>
+              <a:rPr lang="en-US" dirty="0" smtClean="0">
+                <a:solidFill>
+                  <a:schemeClr val="tx1"/>
+                </a:solidFill>
+              </a:rPr>
+              <a:t>#DDD9C3</a:t>
+            </a:r>
+            <a:endParaRPr lang="en-US" dirty="0">
+              <a:solidFill>
+                <a:schemeClr val="tx1"/>
+              </a:solidFill>
+            </a:endParaRPr>
+          </a:p>
+        </p:txBody>
+      </p:sp>
+      <p:sp>
+        <p:nvSpPr>
+          <p:cNvPr id="4" name="Rounded Rectangle 3"/>
+          <p:cNvSpPr/>
+          <p:nvPr/>
+        </p:nvSpPr>
+        <p:spPr>
+          <a:xfrm>
+            <a:off x="381000" y="1524000"/>
+            <a:ext cx="1828800" cy="457200"/>
+          </a:xfrm>
+          <a:prstGeom prst="roundRect">
+            <a:avLst/>
+          </a:prstGeom>
+          <a:solidFill>
+            <a:srgbClr val="C4BD97"/>
+          </a:solidFill>
+          <a:ln>
+            <a:noFill/>
+          </a:ln>
+        </p:spPr>
+        <p:style>
+          <a:lnRef idx="2">
+            <a:schemeClr val="accent1">
+              <a:shade val="50000"/>
+            </a:schemeClr>
+          </a:lnRef>
+          <a:fillRef idx="1">
+            <a:schemeClr val="accent1"/>
+          </a:fillRef>
+          <a:effectRef idx="0">
+            <a:schemeClr val="accent1"/>
+          </a:effectRef>
+          <a:fontRef idx="minor">
+            <a:schemeClr val="lt1"/>
+          </a:fontRef>
+        </p:style>
+        <p:txBody>
+          <a:bodyPr rtlCol="0" anchor="ctr"/>
+          <a:lstStyle/>
+          <a:p>
+            <a:pPr algn="ctr"/>
+            <a:r>
+              <a:rPr lang="en-US" dirty="0" smtClean="0">
+                <a:solidFill>
+                  <a:schemeClr val="tx1"/>
+                </a:solidFill>
+              </a:rPr>
+              <a:t>#C4BD97</a:t>
+            </a:r>
+            <a:endParaRPr lang="en-US" dirty="0">
+              <a:solidFill>
+                <a:schemeClr val="tx1"/>
+              </a:solidFill>
+            </a:endParaRPr>
+          </a:p>
+        </p:txBody>
+      </p:sp>
+      <p:sp>
+        <p:nvSpPr>
+          <p:cNvPr id="5" name="Rounded Rectangle 4"/>
+          <p:cNvSpPr/>
+          <p:nvPr/>
+        </p:nvSpPr>
+        <p:spPr>
+          <a:xfrm>
+            <a:off x="381000" y="2133600"/>
+            <a:ext cx="1828800" cy="457200"/>
+          </a:xfrm>
+          <a:prstGeom prst="roundRect">
+            <a:avLst/>
+          </a:prstGeom>
+          <a:solidFill>
+            <a:srgbClr val="948A54"/>
+          </a:solidFill>
+          <a:ln>
+            <a:noFill/>
+          </a:ln>
+        </p:spPr>
+        <p:style>
+          <a:lnRef idx="2">
+            <a:schemeClr val="accent1">
+              <a:shade val="50000"/>
+            </a:schemeClr>
+          </a:lnRef>
+          <a:fillRef idx="1">
+            <a:schemeClr val="accent1"/>
+          </a:fillRef>
+          <a:effectRef idx="0">
+            <a:schemeClr val="accent1"/>
+          </a:effectRef>
+          <a:fontRef idx="minor">
+            <a:schemeClr val="lt1"/>
+          </a:fontRef>
+        </p:style>
+        <p:txBody>
+          <a:bodyPr rtlCol="0" anchor="ctr"/>
+          <a:lstStyle/>
+          <a:p>
+            <a:pPr algn="ctr"/>
+            <a:r>
+              <a:rPr lang="en-US" dirty="0" smtClean="0">
+                <a:solidFill>
+                  <a:schemeClr val="tx1"/>
+                </a:solidFill>
+              </a:rPr>
+              <a:t>#948A54</a:t>
+            </a:r>
+            <a:endParaRPr lang="en-US" dirty="0">
+              <a:solidFill>
+                <a:schemeClr val="tx1"/>
+              </a:solidFill>
+            </a:endParaRPr>
+          </a:p>
+        </p:txBody>
+      </p:sp>
+      <p:sp>
+        <p:nvSpPr>
+          <p:cNvPr id="6" name="Rounded Rectangle 5"/>
+          <p:cNvSpPr/>
+          <p:nvPr/>
+        </p:nvSpPr>
+        <p:spPr>
+          <a:xfrm>
+            <a:off x="2514600" y="304800"/>
+            <a:ext cx="1828800" cy="457200"/>
+          </a:xfrm>
+          <a:prstGeom prst="roundRect">
+            <a:avLst/>
+          </a:prstGeom>
+          <a:solidFill>
+            <a:srgbClr val="E2E6E6"/>
+          </a:solidFill>
+          <a:ln>
+            <a:noFill/>
+          </a:ln>
+        </p:spPr>
+        <p:style>
+          <a:lnRef idx="2">
+            <a:schemeClr val="accent1">
+              <a:shade val="50000"/>
+            </a:schemeClr>
+          </a:lnRef>
+          <a:fillRef idx="1">
+            <a:schemeClr val="accent1"/>
+          </a:fillRef>
+          <a:effectRef idx="0">
+            <a:schemeClr val="accent1"/>
+          </a:effectRef>
+          <a:fontRef idx="minor">
+            <a:schemeClr val="lt1"/>
+          </a:fontRef>
+        </p:style>
+        <p:txBody>
+          <a:bodyPr rtlCol="0" anchor="ctr"/>
+          <a:lstStyle/>
+          <a:p>
+            <a:pPr algn="ctr"/>
+            <a:r>
+              <a:rPr lang="en-US" dirty="0" smtClean="0">
+                <a:solidFill>
+                  <a:schemeClr val="tx1"/>
+                </a:solidFill>
+              </a:rPr>
+              <a:t>#E2E6E6</a:t>
+            </a:r>
+            <a:endParaRPr lang="en-US" dirty="0">
+              <a:solidFill>
+                <a:schemeClr val="tx1"/>
+              </a:solidFill>
+            </a:endParaRPr>
+          </a:p>
+        </p:txBody>
+      </p:sp>
+      <p:sp>
+        <p:nvSpPr>
+          <p:cNvPr id="7" name="Rounded Rectangle 6"/>
+          <p:cNvSpPr/>
+          <p:nvPr/>
+        </p:nvSpPr>
+        <p:spPr>
+          <a:xfrm>
+            <a:off x="2514600" y="914400"/>
+            <a:ext cx="1828800" cy="457200"/>
+          </a:xfrm>
+          <a:prstGeom prst="roundRect">
+            <a:avLst/>
+          </a:prstGeom>
+          <a:solidFill>
+            <a:srgbClr val="AEC2D0"/>
+          </a:solidFill>
+          <a:ln>
+            <a:noFill/>
+          </a:ln>
+        </p:spPr>
+        <p:style>
+          <a:lnRef idx="2">
+            <a:schemeClr val="accent1">
+              <a:shade val="50000"/>
+            </a:schemeClr>
+          </a:lnRef>
+          <a:fillRef idx="1">
+            <a:schemeClr val="accent1"/>
+          </a:fillRef>
+          <a:effectRef idx="0">
+            <a:schemeClr val="accent1"/>
+          </a:effectRef>
+          <a:fontRef idx="minor">
+            <a:schemeClr val="lt1"/>
+          </a:fontRef>
+        </p:style>
+        <p:txBody>
+          <a:bodyPr rtlCol="0" anchor="ctr"/>
+          <a:lstStyle/>
+          <a:p>
+            <a:pPr algn="ctr"/>
+            <a:r>
+              <a:rPr lang="en-US" dirty="0" smtClean="0">
+                <a:solidFill>
+                  <a:schemeClr val="tx1"/>
+                </a:solidFill>
+              </a:rPr>
+              <a:t>#AEC2D0</a:t>
+            </a:r>
+            <a:endParaRPr lang="en-US" dirty="0">
+              <a:solidFill>
+                <a:schemeClr val="tx1"/>
+              </a:solidFill>
+            </a:endParaRPr>
+          </a:p>
+        </p:txBody>
+      </p:sp>
+      <p:sp>
+        <p:nvSpPr>
+          <p:cNvPr id="8" name="Rounded Rectangle 7"/>
+          <p:cNvSpPr/>
+          <p:nvPr/>
+        </p:nvSpPr>
+        <p:spPr>
+          <a:xfrm>
+            <a:off x="2514600" y="1524000"/>
+            <a:ext cx="1828800" cy="457200"/>
+          </a:xfrm>
+          <a:prstGeom prst="roundRect">
+            <a:avLst/>
+          </a:prstGeom>
+          <a:solidFill>
+            <a:srgbClr val="6D92AB"/>
+          </a:solidFill>
+          <a:ln>
+            <a:noFill/>
+          </a:ln>
+        </p:spPr>
+        <p:style>
+          <a:lnRef idx="2">
+            <a:schemeClr val="accent1">
+              <a:shade val="50000"/>
+            </a:schemeClr>
+          </a:lnRef>
+          <a:fillRef idx="1">
+            <a:schemeClr val="accent1"/>
+          </a:fillRef>
+          <a:effectRef idx="0">
+            <a:schemeClr val="accent1"/>
+          </a:effectRef>
+          <a:fontRef idx="minor">
+            <a:schemeClr val="lt1"/>
+          </a:fontRef>
+        </p:style>
+        <p:txBody>
+          <a:bodyPr rtlCol="0" anchor="ctr"/>
+          <a:lstStyle/>
+          <a:p>
+            <a:pPr algn="ctr"/>
+            <a:r>
+              <a:rPr lang="en-US" dirty="0" smtClean="0">
+                <a:solidFill>
+                  <a:schemeClr val="tx1"/>
+                </a:solidFill>
+              </a:rPr>
+              <a:t>#6D92AB</a:t>
+            </a:r>
+            <a:endParaRPr lang="en-US" dirty="0">
+              <a:solidFill>
+                <a:schemeClr val="tx1"/>
+              </a:solidFill>
+            </a:endParaRPr>
+          </a:p>
+        </p:txBody>
+      </p:sp>
+      <p:sp>
+        <p:nvSpPr>
+          <p:cNvPr id="9" name="Rounded Rectangle 8"/>
+          <p:cNvSpPr/>
+          <p:nvPr/>
+        </p:nvSpPr>
+        <p:spPr>
+          <a:xfrm>
+            <a:off x="2514600" y="2133600"/>
+            <a:ext cx="1828800" cy="457200"/>
+          </a:xfrm>
+          <a:prstGeom prst="roundRect">
+            <a:avLst/>
+          </a:prstGeom>
+          <a:solidFill>
+            <a:srgbClr val="50738A"/>
+          </a:solidFill>
+          <a:ln>
+            <a:noFill/>
+          </a:ln>
+        </p:spPr>
+        <p:style>
+          <a:lnRef idx="2">
+            <a:schemeClr val="accent1">
+              <a:shade val="50000"/>
+            </a:schemeClr>
+          </a:lnRef>
+          <a:fillRef idx="1">
+            <a:schemeClr val="accent1"/>
+          </a:fillRef>
+          <a:effectRef idx="0">
+            <a:schemeClr val="accent1"/>
+          </a:effectRef>
+          <a:fontRef idx="minor">
+            <a:schemeClr val="lt1"/>
+          </a:fontRef>
+        </p:style>
+        <p:txBody>
+          <a:bodyPr rtlCol="0" anchor="ctr"/>
+          <a:lstStyle/>
+          <a:p>
+            <a:pPr algn="ctr"/>
+            <a:r>
+              <a:rPr lang="en-US" dirty="0" smtClean="0">
+                <a:solidFill>
+                  <a:schemeClr val="tx1"/>
+                </a:solidFill>
+              </a:rPr>
+              <a:t>#50738A</a:t>
+            </a:r>
+            <a:endParaRPr lang="en-US" dirty="0">
+              <a:solidFill>
+                <a:schemeClr val="tx1"/>
+              </a:solidFill>
+            </a:endParaRPr>
+          </a:p>
+        </p:txBody>
+      </p:sp>
+      <p:sp>
+        <p:nvSpPr>
+          <p:cNvPr id="10" name="Rounded Rectangle 9"/>
+          <p:cNvSpPr/>
+          <p:nvPr/>
+        </p:nvSpPr>
+        <p:spPr>
+          <a:xfrm>
+            <a:off x="4648200" y="304800"/>
+            <a:ext cx="1828800" cy="457200"/>
+          </a:xfrm>
+          <a:prstGeom prst="roundRect">
+            <a:avLst/>
+          </a:prstGeom>
+          <a:solidFill>
+            <a:srgbClr val="F5F0D2"/>
+          </a:solidFill>
+          <a:ln>
+            <a:noFill/>
+          </a:ln>
+        </p:spPr>
+        <p:style>
+          <a:lnRef idx="2">
+            <a:schemeClr val="accent1">
+              <a:shade val="50000"/>
+            </a:schemeClr>
+          </a:lnRef>
+          <a:fillRef idx="1">
+            <a:schemeClr val="accent1"/>
+          </a:fillRef>
+          <a:effectRef idx="0">
+            <a:schemeClr val="accent1"/>
+          </a:effectRef>
+          <a:fontRef idx="minor">
+            <a:schemeClr val="lt1"/>
+          </a:fontRef>
+        </p:style>
+        <p:txBody>
+          <a:bodyPr rtlCol="0" anchor="ctr"/>
+          <a:lstStyle/>
+          <a:p>
+            <a:pPr algn="ctr"/>
+            <a:r>
+              <a:rPr lang="en-US" dirty="0">
+                <a:solidFill>
+                  <a:schemeClr val="tx1"/>
+                </a:solidFill>
+              </a:rPr>
+              <a:t>#F5F0D2</a:t>
+            </a:r>
+          </a:p>
+        </p:txBody>
+      </p:sp>
+      <p:sp>
+        <p:nvSpPr>
+          <p:cNvPr id="11" name="Rounded Rectangle 10"/>
+          <p:cNvSpPr/>
+          <p:nvPr/>
+        </p:nvSpPr>
+        <p:spPr>
+          <a:xfrm>
+            <a:off x="4648200" y="914400"/>
+            <a:ext cx="1828800" cy="457200"/>
+          </a:xfrm>
+          <a:prstGeom prst="roundRect">
+            <a:avLst/>
+          </a:prstGeom>
+          <a:solidFill>
+            <a:srgbClr val="ECE4B2"/>
+          </a:solidFill>
+          <a:ln>
+            <a:noFill/>
+          </a:ln>
+        </p:spPr>
+        <p:style>
+          <a:lnRef idx="2">
+            <a:schemeClr val="accent1">
+              <a:shade val="50000"/>
+            </a:schemeClr>
+          </a:lnRef>
+          <a:fillRef idx="1">
+            <a:schemeClr val="accent1"/>
+          </a:fillRef>
+          <a:effectRef idx="0">
+            <a:schemeClr val="accent1"/>
+          </a:effectRef>
+          <a:fontRef idx="minor">
+            <a:schemeClr val="lt1"/>
+          </a:fontRef>
+        </p:style>
+        <p:txBody>
+          <a:bodyPr rtlCol="0" anchor="ctr"/>
+          <a:lstStyle/>
+          <a:p>
+            <a:pPr algn="ctr"/>
+            <a:r>
+              <a:rPr lang="en-US" dirty="0">
+                <a:solidFill>
+                  <a:schemeClr val="tx1"/>
+                </a:solidFill>
+              </a:rPr>
+              <a:t>#ECE4B2</a:t>
+            </a:r>
+          </a:p>
+        </p:txBody>
+      </p:sp>
+    </p:spTree>
+    <p:extLst>
+      <p:ext uri="{BB962C8B-B14F-4D97-AF65-F5344CB8AC3E}">
+        <p14:creationId xmlns:p14="http://schemas.microsoft.com/office/powerpoint/2010/main" val="3503806962"/>
+      </p:ext>
+    </p:extLst>
+  </p:cSld>
+  <p:clrMapOvr>
+    <a:masterClrMapping/>
+  </p:clrMapOvr>
+</p:sld>
+</file>
+
+<file path=ppt/slides/slide2.xml><?xml version="1.0" encoding="utf-8"?>
+<p:sld xmlns:a="http://schemas.openxmlformats.org/drawingml/2006/main" xmlns:r="http://schemas.openxmlformats.org/officeDocument/2006/relationships" xmlns:p="http://schemas.openxmlformats.org/presentationml/2006/main">
+  <p:cSld>
     <p:spTree>
       <p:nvGrpSpPr>
         <p:cNvPr id="1" name=""/>
@@ -4021,7 +4630,7 @@
 </p:sld>
 </file>
 
-<file path=ppt/slides/slide2.xml><?xml version="1.0" encoding="utf-8"?>
+<file path=ppt/slides/slide3.xml><?xml version="1.0" encoding="utf-8"?>
 <p:sld xmlns:a="http://schemas.openxmlformats.org/drawingml/2006/main" xmlns:r="http://schemas.openxmlformats.org/officeDocument/2006/relationships" xmlns:p="http://schemas.openxmlformats.org/presentationml/2006/main">
   <p:cSld>
     <p:spTree>
@@ -6774,7 +7383,7 @@
 </p:sld>
 </file>
 
-<file path=ppt/slides/slide3.xml><?xml version="1.0" encoding="utf-8"?>
+<file path=ppt/slides/slide4.xml><?xml version="1.0" encoding="utf-8"?>
 <p:sld xmlns:a="http://schemas.openxmlformats.org/drawingml/2006/main" xmlns:r="http://schemas.openxmlformats.org/officeDocument/2006/relationships" xmlns:p="http://schemas.openxmlformats.org/presentationml/2006/main">
   <p:cSld>
     <p:spTree>
@@ -9354,7 +9963,7 @@
 </p:sld>
 </file>
 
-<file path=ppt/slides/slide4.xml><?xml version="1.0" encoding="utf-8"?>
+<file path=ppt/slides/slide5.xml><?xml version="1.0" encoding="utf-8"?>
 <p:sld xmlns:a="http://schemas.openxmlformats.org/drawingml/2006/main" xmlns:r="http://schemas.openxmlformats.org/officeDocument/2006/relationships" xmlns:p="http://schemas.openxmlformats.org/presentationml/2006/main">
   <p:cSld>
     <p:spTree>
@@ -11933,7 +12542,7 @@
 </p:sld>
 </file>
 
-<file path=ppt/slides/slide5.xml><?xml version="1.0" encoding="utf-8"?>
+<file path=ppt/slides/slide6.xml><?xml version="1.0" encoding="utf-8"?>
 <p:sld xmlns:a="http://schemas.openxmlformats.org/drawingml/2006/main" xmlns:r="http://schemas.openxmlformats.org/officeDocument/2006/relationships" xmlns:p="http://schemas.openxmlformats.org/presentationml/2006/main">
   <p:cSld>
     <p:spTree>
@@ -14566,6 +15175,76 @@
           </a:p>
         </p:txBody>
       </p:sp>
+      <p:sp>
+        <p:nvSpPr>
+          <p:cNvPr id="69" name="TextBox 68"/>
+          <p:cNvSpPr txBox="1"/>
+          <p:nvPr/>
+        </p:nvSpPr>
+        <p:spPr>
+          <a:xfrm rot="10800000">
+            <a:off x="1236901" y="868481"/>
+            <a:ext cx="253226" cy="261610"/>
+          </a:xfrm>
+          <a:prstGeom prst="rect">
+            <a:avLst/>
+          </a:prstGeom>
+          <a:noFill/>
+          <a:effectLst/>
+        </p:spPr>
+        <p:txBody>
+          <a:bodyPr wrap="square" rtlCol="0">
+            <a:spAutoFit/>
+          </a:bodyPr>
+          <a:lstStyle/>
+          <a:p>
+            <a:r>
+              <a:rPr lang="en-US" sz="1100" dirty="0" smtClean="0"/>
+              <a:t>⟪</a:t>
+            </a:r>
+            <a:endParaRPr lang="en-US" sz="1100" dirty="0"/>
+          </a:p>
+        </p:txBody>
+      </p:sp>
+      <p:sp>
+        <p:nvSpPr>
+          <p:cNvPr id="70" name="TextBox 69"/>
+          <p:cNvSpPr txBox="1"/>
+          <p:nvPr/>
+        </p:nvSpPr>
+        <p:spPr>
+          <a:xfrm rot="10800000">
+            <a:off x="1428597" y="868481"/>
+            <a:ext cx="253226" cy="261610"/>
+          </a:xfrm>
+          <a:prstGeom prst="rect">
+            <a:avLst/>
+          </a:prstGeom>
+          <a:noFill/>
+          <a:effectLst/>
+        </p:spPr>
+        <p:txBody>
+          <a:bodyPr wrap="square" rtlCol="0">
+            <a:spAutoFit/>
+          </a:bodyPr>
+          <a:lstStyle/>
+          <a:p>
+            <a:r>
+              <a:rPr lang="en-US" sz="1100" dirty="0" smtClean="0">
+                <a:solidFill>
+                  <a:srgbClr val="AEC2D0"/>
+                </a:solidFill>
+              </a:rPr>
+              <a:t>⟪</a:t>
+            </a:r>
+            <a:endParaRPr lang="en-US" sz="1100" dirty="0">
+              <a:solidFill>
+                <a:srgbClr val="AEC2D0"/>
+              </a:solidFill>
+            </a:endParaRPr>
+          </a:p>
+        </p:txBody>
+      </p:sp>
     </p:spTree>
     <p:extLst>
       <p:ext uri="{BB962C8B-B14F-4D97-AF65-F5344CB8AC3E}">
@@ -14579,7 +15258,7 @@
 </p:sld>
 </file>
 
-<file path=ppt/slides/slide6.xml><?xml version="1.0" encoding="utf-8"?>
+<file path=ppt/slides/slide7.xml><?xml version="1.0" encoding="utf-8"?>
 <p:sld xmlns:a="http://schemas.openxmlformats.org/drawingml/2006/main" xmlns:r="http://schemas.openxmlformats.org/officeDocument/2006/relationships" xmlns:p="http://schemas.openxmlformats.org/presentationml/2006/main">
   <p:cSld>
     <p:spTree>
@@ -14863,7 +15542,7 @@
 </p:sld>
 </file>
 
-<file path=ppt/slides/slide7.xml><?xml version="1.0" encoding="utf-8"?>
+<file path=ppt/slides/slide8.xml><?xml version="1.0" encoding="utf-8"?>
 <p:sld xmlns:a="http://schemas.openxmlformats.org/drawingml/2006/main" xmlns:r="http://schemas.openxmlformats.org/officeDocument/2006/relationships" xmlns:p="http://schemas.openxmlformats.org/presentationml/2006/main">
   <p:cSld>
     <p:spTree>

</xml_diff>

<commit_message>
model updates, first functional manager UX
</commit_message>
<xml_diff>
--- a/documents/design/webportal/Web Portal Design Graphics.pptx
+++ b/documents/design/webportal/Web Portal Design Graphics.pptx
@@ -199,7 +199,7 @@
           <a:p>
             <a:fld id="{ABBC0DEB-B0BC-4CA7-A885-C7D164CEF9CA}" type="datetimeFigureOut">
               <a:rPr lang="en-US" smtClean="0"/>
-              <a:t>2/24/2012</a:t>
+              <a:t>2/29/2012</a:t>
             </a:fld>
             <a:endParaRPr lang="en-US"/>
           </a:p>
@@ -732,7 +732,7 @@
           <a:p>
             <a:fld id="{EEED50E4-BD2F-46D6-A43A-366B2EDD972C}" type="datetimeFigureOut">
               <a:rPr lang="en-US" smtClean="0"/>
-              <a:t>2/24/2012</a:t>
+              <a:t>2/29/2012</a:t>
             </a:fld>
             <a:endParaRPr lang="en-US"/>
           </a:p>
@@ -902,7 +902,7 @@
           <a:p>
             <a:fld id="{EEED50E4-BD2F-46D6-A43A-366B2EDD972C}" type="datetimeFigureOut">
               <a:rPr lang="en-US" smtClean="0"/>
-              <a:t>2/24/2012</a:t>
+              <a:t>2/29/2012</a:t>
             </a:fld>
             <a:endParaRPr lang="en-US"/>
           </a:p>
@@ -1082,7 +1082,7 @@
           <a:p>
             <a:fld id="{EEED50E4-BD2F-46D6-A43A-366B2EDD972C}" type="datetimeFigureOut">
               <a:rPr lang="en-US" smtClean="0"/>
-              <a:t>2/24/2012</a:t>
+              <a:t>2/29/2012</a:t>
             </a:fld>
             <a:endParaRPr lang="en-US"/>
           </a:p>
@@ -1252,7 +1252,7 @@
           <a:p>
             <a:fld id="{EEED50E4-BD2F-46D6-A43A-366B2EDD972C}" type="datetimeFigureOut">
               <a:rPr lang="en-US" smtClean="0"/>
-              <a:t>2/24/2012</a:t>
+              <a:t>2/29/2012</a:t>
             </a:fld>
             <a:endParaRPr lang="en-US"/>
           </a:p>
@@ -1498,7 +1498,7 @@
           <a:p>
             <a:fld id="{EEED50E4-BD2F-46D6-A43A-366B2EDD972C}" type="datetimeFigureOut">
               <a:rPr lang="en-US" smtClean="0"/>
-              <a:t>2/24/2012</a:t>
+              <a:t>2/29/2012</a:t>
             </a:fld>
             <a:endParaRPr lang="en-US"/>
           </a:p>
@@ -1786,7 +1786,7 @@
           <a:p>
             <a:fld id="{EEED50E4-BD2F-46D6-A43A-366B2EDD972C}" type="datetimeFigureOut">
               <a:rPr lang="en-US" smtClean="0"/>
-              <a:t>2/24/2012</a:t>
+              <a:t>2/29/2012</a:t>
             </a:fld>
             <a:endParaRPr lang="en-US"/>
           </a:p>
@@ -2208,7 +2208,7 @@
           <a:p>
             <a:fld id="{EEED50E4-BD2F-46D6-A43A-366B2EDD972C}" type="datetimeFigureOut">
               <a:rPr lang="en-US" smtClean="0"/>
-              <a:t>2/24/2012</a:t>
+              <a:t>2/29/2012</a:t>
             </a:fld>
             <a:endParaRPr lang="en-US"/>
           </a:p>
@@ -2326,7 +2326,7 @@
           <a:p>
             <a:fld id="{EEED50E4-BD2F-46D6-A43A-366B2EDD972C}" type="datetimeFigureOut">
               <a:rPr lang="en-US" smtClean="0"/>
-              <a:t>2/24/2012</a:t>
+              <a:t>2/29/2012</a:t>
             </a:fld>
             <a:endParaRPr lang="en-US"/>
           </a:p>
@@ -2421,7 +2421,7 @@
           <a:p>
             <a:fld id="{EEED50E4-BD2F-46D6-A43A-366B2EDD972C}" type="datetimeFigureOut">
               <a:rPr lang="en-US" smtClean="0"/>
-              <a:t>2/24/2012</a:t>
+              <a:t>2/29/2012</a:t>
             </a:fld>
             <a:endParaRPr lang="en-US"/>
           </a:p>
@@ -2698,7 +2698,7 @@
           <a:p>
             <a:fld id="{EEED50E4-BD2F-46D6-A43A-366B2EDD972C}" type="datetimeFigureOut">
               <a:rPr lang="en-US" smtClean="0"/>
-              <a:t>2/24/2012</a:t>
+              <a:t>2/29/2012</a:t>
             </a:fld>
             <a:endParaRPr lang="en-US"/>
           </a:p>
@@ -2951,7 +2951,7 @@
           <a:p>
             <a:fld id="{EEED50E4-BD2F-46D6-A43A-366B2EDD972C}" type="datetimeFigureOut">
               <a:rPr lang="en-US" smtClean="0"/>
-              <a:t>2/24/2012</a:t>
+              <a:t>2/29/2012</a:t>
             </a:fld>
             <a:endParaRPr lang="en-US"/>
           </a:p>
@@ -3018,7 +3018,7 @@
     <p:bg>
       <p:bgPr>
         <a:solidFill>
-          <a:srgbClr val="E2E6EA"/>
+          <a:srgbClr val="E2E6E6"/>
         </a:solidFill>
         <a:effectLst/>
       </p:bgPr>
@@ -3167,7 +3167,7 @@
           <a:p>
             <a:fld id="{EEED50E4-BD2F-46D6-A43A-366B2EDD972C}" type="datetimeFigureOut">
               <a:rPr lang="en-US" smtClean="0"/>
-              <a:t>2/24/2012</a:t>
+              <a:t>2/29/2012</a:t>
             </a:fld>
             <a:endParaRPr lang="en-US"/>
           </a:p>
@@ -14919,54 +14919,6 @@
       </p:sp>
       <p:sp>
         <p:nvSpPr>
-          <p:cNvPr id="2" name="Rounded Rectangle 1"/>
-          <p:cNvSpPr/>
-          <p:nvPr/>
-        </p:nvSpPr>
-        <p:spPr>
-          <a:xfrm>
-            <a:off x="1190329" y="0"/>
-            <a:ext cx="945195" cy="621436"/>
-          </a:xfrm>
-          <a:prstGeom prst="roundRect">
-            <a:avLst/>
-          </a:prstGeom>
-          <a:solidFill>
-            <a:srgbClr val="E2E6E6"/>
-          </a:solidFill>
-          <a:ln w="6350">
-            <a:solidFill>
-              <a:schemeClr val="tx1"/>
-            </a:solidFill>
-          </a:ln>
-        </p:spPr>
-        <p:style>
-          <a:lnRef idx="2">
-            <a:schemeClr val="accent1">
-              <a:shade val="50000"/>
-            </a:schemeClr>
-          </a:lnRef>
-          <a:fillRef idx="1">
-            <a:schemeClr val="accent1"/>
-          </a:fillRef>
-          <a:effectRef idx="0">
-            <a:schemeClr val="accent1"/>
-          </a:effectRef>
-          <a:fontRef idx="minor">
-            <a:schemeClr val="lt1"/>
-          </a:fontRef>
-        </p:style>
-        <p:txBody>
-          <a:bodyPr rtlCol="0" anchor="ctr"/>
-          <a:lstStyle/>
-          <a:p>
-            <a:pPr algn="ctr"/>
-            <a:endParaRPr lang="en-US"/>
-          </a:p>
-        </p:txBody>
-      </p:sp>
-      <p:sp>
-        <p:nvSpPr>
           <p:cNvPr id="62" name="Rounded Rectangle 61"/>
           <p:cNvSpPr/>
           <p:nvPr/>
@@ -15183,7 +15135,7 @@
         </p:nvSpPr>
         <p:spPr>
           <a:xfrm rot="10800000">
-            <a:off x="1236901" y="868481"/>
+            <a:off x="1045205" y="633651"/>
             <a:ext cx="253226" cy="261610"/>
           </a:xfrm>
           <a:prstGeom prst="rect">
@@ -15214,7 +15166,7 @@
         </p:nvSpPr>
         <p:spPr>
           <a:xfrm rot="10800000">
-            <a:off x="1428597" y="868481"/>
+            <a:off x="1236901" y="633651"/>
             <a:ext cx="253226" cy="261610"/>
           </a:xfrm>
           <a:prstGeom prst="rect">
@@ -15240,6 +15192,45 @@
             <a:endParaRPr lang="en-US" sz="1100" dirty="0">
               <a:solidFill>
                 <a:srgbClr val="AEC2D0"/>
+              </a:solidFill>
+            </a:endParaRPr>
+          </a:p>
+        </p:txBody>
+      </p:sp>
+      <p:sp>
+        <p:nvSpPr>
+          <p:cNvPr id="71" name="TextBox 70"/>
+          <p:cNvSpPr txBox="1"/>
+          <p:nvPr/>
+        </p:nvSpPr>
+        <p:spPr>
+          <a:xfrm rot="10800000">
+            <a:off x="737374" y="640525"/>
+            <a:ext cx="253226" cy="261610"/>
+          </a:xfrm>
+          <a:prstGeom prst="rect">
+            <a:avLst/>
+          </a:prstGeom>
+          <a:noFill/>
+          <a:effectLst/>
+        </p:spPr>
+        <p:txBody>
+          <a:bodyPr wrap="square" rtlCol="0">
+            <a:spAutoFit/>
+          </a:bodyPr>
+          <a:lstStyle/>
+          <a:p>
+            <a:r>
+              <a:rPr lang="en-US" sz="1100" dirty="0" smtClean="0">
+                <a:solidFill>
+                  <a:srgbClr val="E2E6E6"/>
+                </a:solidFill>
+              </a:rPr>
+              <a:t>⟪</a:t>
+            </a:r>
+            <a:endParaRPr lang="en-US" sz="1100" dirty="0">
+              <a:solidFill>
+                <a:srgbClr val="E2E6E6"/>
               </a:solidFill>
             </a:endParaRPr>
           </a:p>

</xml_diff>

<commit_message>
add toolbar, folderlist as select-only metaphor
</commit_message>
<xml_diff>
--- a/documents/design/webportal/Web Portal Design Graphics.pptx
+++ b/documents/design/webportal/Web Portal Design Graphics.pptx
@@ -199,7 +199,7 @@
           <a:p>
             <a:fld id="{ABBC0DEB-B0BC-4CA7-A885-C7D164CEF9CA}" type="datetimeFigureOut">
               <a:rPr lang="en-US" smtClean="0"/>
-              <a:t>2/29/2012</a:t>
+              <a:t>3/5/2012</a:t>
             </a:fld>
             <a:endParaRPr lang="en-US"/>
           </a:p>
@@ -732,7 +732,7 @@
           <a:p>
             <a:fld id="{EEED50E4-BD2F-46D6-A43A-366B2EDD972C}" type="datetimeFigureOut">
               <a:rPr lang="en-US" smtClean="0"/>
-              <a:t>2/29/2012</a:t>
+              <a:t>3/5/2012</a:t>
             </a:fld>
             <a:endParaRPr lang="en-US"/>
           </a:p>
@@ -902,7 +902,7 @@
           <a:p>
             <a:fld id="{EEED50E4-BD2F-46D6-A43A-366B2EDD972C}" type="datetimeFigureOut">
               <a:rPr lang="en-US" smtClean="0"/>
-              <a:t>2/29/2012</a:t>
+              <a:t>3/5/2012</a:t>
             </a:fld>
             <a:endParaRPr lang="en-US"/>
           </a:p>
@@ -1082,7 +1082,7 @@
           <a:p>
             <a:fld id="{EEED50E4-BD2F-46D6-A43A-366B2EDD972C}" type="datetimeFigureOut">
               <a:rPr lang="en-US" smtClean="0"/>
-              <a:t>2/29/2012</a:t>
+              <a:t>3/5/2012</a:t>
             </a:fld>
             <a:endParaRPr lang="en-US"/>
           </a:p>
@@ -1252,7 +1252,7 @@
           <a:p>
             <a:fld id="{EEED50E4-BD2F-46D6-A43A-366B2EDD972C}" type="datetimeFigureOut">
               <a:rPr lang="en-US" smtClean="0"/>
-              <a:t>2/29/2012</a:t>
+              <a:t>3/5/2012</a:t>
             </a:fld>
             <a:endParaRPr lang="en-US"/>
           </a:p>
@@ -1498,7 +1498,7 @@
           <a:p>
             <a:fld id="{EEED50E4-BD2F-46D6-A43A-366B2EDD972C}" type="datetimeFigureOut">
               <a:rPr lang="en-US" smtClean="0"/>
-              <a:t>2/29/2012</a:t>
+              <a:t>3/5/2012</a:t>
             </a:fld>
             <a:endParaRPr lang="en-US"/>
           </a:p>
@@ -1786,7 +1786,7 @@
           <a:p>
             <a:fld id="{EEED50E4-BD2F-46D6-A43A-366B2EDD972C}" type="datetimeFigureOut">
               <a:rPr lang="en-US" smtClean="0"/>
-              <a:t>2/29/2012</a:t>
+              <a:t>3/5/2012</a:t>
             </a:fld>
             <a:endParaRPr lang="en-US"/>
           </a:p>
@@ -2208,7 +2208,7 @@
           <a:p>
             <a:fld id="{EEED50E4-BD2F-46D6-A43A-366B2EDD972C}" type="datetimeFigureOut">
               <a:rPr lang="en-US" smtClean="0"/>
-              <a:t>2/29/2012</a:t>
+              <a:t>3/5/2012</a:t>
             </a:fld>
             <a:endParaRPr lang="en-US"/>
           </a:p>
@@ -2326,7 +2326,7 @@
           <a:p>
             <a:fld id="{EEED50E4-BD2F-46D6-A43A-366B2EDD972C}" type="datetimeFigureOut">
               <a:rPr lang="en-US" smtClean="0"/>
-              <a:t>2/29/2012</a:t>
+              <a:t>3/5/2012</a:t>
             </a:fld>
             <a:endParaRPr lang="en-US"/>
           </a:p>
@@ -2421,7 +2421,7 @@
           <a:p>
             <a:fld id="{EEED50E4-BD2F-46D6-A43A-366B2EDD972C}" type="datetimeFigureOut">
               <a:rPr lang="en-US" smtClean="0"/>
-              <a:t>2/29/2012</a:t>
+              <a:t>3/5/2012</a:t>
             </a:fld>
             <a:endParaRPr lang="en-US"/>
           </a:p>
@@ -2698,7 +2698,7 @@
           <a:p>
             <a:fld id="{EEED50E4-BD2F-46D6-A43A-366B2EDD972C}" type="datetimeFigureOut">
               <a:rPr lang="en-US" smtClean="0"/>
-              <a:t>2/29/2012</a:t>
+              <a:t>3/5/2012</a:t>
             </a:fld>
             <a:endParaRPr lang="en-US"/>
           </a:p>
@@ -2951,7 +2951,7 @@
           <a:p>
             <a:fld id="{EEED50E4-BD2F-46D6-A43A-366B2EDD972C}" type="datetimeFigureOut">
               <a:rPr lang="en-US" smtClean="0"/>
-              <a:t>2/29/2012</a:t>
+              <a:t>3/5/2012</a:t>
             </a:fld>
             <a:endParaRPr lang="en-US"/>
           </a:p>
@@ -3167,7 +3167,7 @@
           <a:p>
             <a:fld id="{EEED50E4-BD2F-46D6-A43A-366B2EDD972C}" type="datetimeFigureOut">
               <a:rPr lang="en-US" smtClean="0"/>
-              <a:t>2/29/2012</a:t>
+              <a:t>3/5/2012</a:t>
             </a:fld>
             <a:endParaRPr lang="en-US"/>
           </a:p>
@@ -15236,6 +15236,283 @@
           </a:p>
         </p:txBody>
       </p:sp>
+      <p:sp>
+        <p:nvSpPr>
+          <p:cNvPr id="72" name="Rounded Rectangle 71"/>
+          <p:cNvSpPr/>
+          <p:nvPr/>
+        </p:nvSpPr>
+        <p:spPr>
+          <a:xfrm>
+            <a:off x="1981200" y="427221"/>
+            <a:ext cx="685800" cy="627017"/>
+          </a:xfrm>
+          <a:prstGeom prst="roundRect">
+            <a:avLst>
+              <a:gd name="adj" fmla="val 0"/>
+            </a:avLst>
+          </a:prstGeom>
+          <a:solidFill>
+            <a:srgbClr val="AEC2D0"/>
+          </a:solidFill>
+          <a:ln w="31750" cmpd="sng">
+            <a:noFill/>
+            <a:prstDash val="solid"/>
+            <a:round/>
+          </a:ln>
+          <a:effectLst>
+            <a:outerShdw blurRad="63500" dist="38100" dir="5400000" algn="t" rotWithShape="0">
+              <a:srgbClr val="4172AD">
+                <a:alpha val="40000"/>
+              </a:srgbClr>
+            </a:outerShdw>
+          </a:effectLst>
+        </p:spPr>
+        <p:style>
+          <a:lnRef idx="2">
+            <a:schemeClr val="accent1">
+              <a:shade val="50000"/>
+            </a:schemeClr>
+          </a:lnRef>
+          <a:fillRef idx="1">
+            <a:schemeClr val="accent1"/>
+          </a:fillRef>
+          <a:effectRef idx="0">
+            <a:schemeClr val="accent1"/>
+          </a:effectRef>
+          <a:fontRef idx="minor">
+            <a:schemeClr val="lt1"/>
+          </a:fontRef>
+        </p:style>
+        <p:txBody>
+          <a:bodyPr rtlCol="0" anchor="ctr"/>
+          <a:lstStyle/>
+          <a:p>
+            <a:pPr algn="ctr"/>
+            <a:endParaRPr lang="en-US"/>
+          </a:p>
+        </p:txBody>
+      </p:sp>
+      <p:sp>
+        <p:nvSpPr>
+          <p:cNvPr id="2" name="Isosceles Triangle 1"/>
+          <p:cNvSpPr>
+            <a:spLocks noChangeAspect="1"/>
+          </p:cNvSpPr>
+          <p:nvPr/>
+        </p:nvSpPr>
+        <p:spPr>
+          <a:xfrm>
+            <a:off x="2060431" y="581848"/>
+            <a:ext cx="91440" cy="42550"/>
+          </a:xfrm>
+          <a:prstGeom prst="triangle">
+            <a:avLst/>
+          </a:prstGeom>
+          <a:solidFill>
+            <a:srgbClr val="50738A"/>
+          </a:solidFill>
+          <a:ln w="9525">
+            <a:noFill/>
+          </a:ln>
+          <a:scene3d>
+            <a:camera prst="orthographicFront"/>
+            <a:lightRig rig="threePt" dir="t"/>
+          </a:scene3d>
+          <a:sp3d>
+            <a:bevelT h="50800"/>
+          </a:sp3d>
+        </p:spPr>
+        <p:style>
+          <a:lnRef idx="2">
+            <a:schemeClr val="accent1">
+              <a:shade val="50000"/>
+            </a:schemeClr>
+          </a:lnRef>
+          <a:fillRef idx="1">
+            <a:schemeClr val="accent1"/>
+          </a:fillRef>
+          <a:effectRef idx="0">
+            <a:schemeClr val="accent1"/>
+          </a:effectRef>
+          <a:fontRef idx="minor">
+            <a:schemeClr val="lt1"/>
+          </a:fontRef>
+        </p:style>
+        <p:txBody>
+          <a:bodyPr rtlCol="0" anchor="ctr"/>
+          <a:lstStyle/>
+          <a:p>
+            <a:pPr algn="ctr"/>
+            <a:endParaRPr lang="en-US"/>
+          </a:p>
+        </p:txBody>
+      </p:sp>
+      <p:sp>
+        <p:nvSpPr>
+          <p:cNvPr id="78" name="Isosceles Triangle 77"/>
+          <p:cNvSpPr>
+            <a:spLocks noChangeAspect="1"/>
+          </p:cNvSpPr>
+          <p:nvPr/>
+        </p:nvSpPr>
+        <p:spPr>
+          <a:xfrm rot="10800000">
+            <a:off x="2084009" y="850724"/>
+            <a:ext cx="91440" cy="42550"/>
+          </a:xfrm>
+          <a:prstGeom prst="triangle">
+            <a:avLst/>
+          </a:prstGeom>
+          <a:solidFill>
+            <a:srgbClr val="50738A"/>
+          </a:solidFill>
+          <a:ln w="9525">
+            <a:noFill/>
+          </a:ln>
+          <a:scene3d>
+            <a:camera prst="orthographicFront"/>
+            <a:lightRig rig="threePt" dir="t"/>
+          </a:scene3d>
+          <a:sp3d>
+            <a:bevelT h="50800"/>
+          </a:sp3d>
+        </p:spPr>
+        <p:style>
+          <a:lnRef idx="2">
+            <a:schemeClr val="accent1">
+              <a:shade val="50000"/>
+            </a:schemeClr>
+          </a:lnRef>
+          <a:fillRef idx="1">
+            <a:schemeClr val="accent1"/>
+          </a:fillRef>
+          <a:effectRef idx="0">
+            <a:schemeClr val="accent1"/>
+          </a:effectRef>
+          <a:fontRef idx="minor">
+            <a:schemeClr val="lt1"/>
+          </a:fontRef>
+        </p:style>
+        <p:txBody>
+          <a:bodyPr rtlCol="0" anchor="ctr"/>
+          <a:lstStyle/>
+          <a:p>
+            <a:pPr algn="ctr"/>
+            <a:endParaRPr lang="en-US"/>
+          </a:p>
+        </p:txBody>
+      </p:sp>
+      <p:sp>
+        <p:nvSpPr>
+          <p:cNvPr id="79" name="Isosceles Triangle 78"/>
+          <p:cNvSpPr>
+            <a:spLocks noChangeAspect="1"/>
+          </p:cNvSpPr>
+          <p:nvPr/>
+        </p:nvSpPr>
+        <p:spPr>
+          <a:xfrm>
+            <a:off x="2362200" y="580816"/>
+            <a:ext cx="91440" cy="42550"/>
+          </a:xfrm>
+          <a:prstGeom prst="triangle">
+            <a:avLst/>
+          </a:prstGeom>
+          <a:solidFill>
+            <a:srgbClr val="E2E6E6"/>
+          </a:solidFill>
+          <a:ln w="9525">
+            <a:noFill/>
+          </a:ln>
+          <a:scene3d>
+            <a:camera prst="orthographicFront"/>
+            <a:lightRig rig="threePt" dir="t"/>
+          </a:scene3d>
+          <a:sp3d>
+            <a:bevelT w="101600" h="25400"/>
+          </a:sp3d>
+        </p:spPr>
+        <p:style>
+          <a:lnRef idx="2">
+            <a:schemeClr val="accent1">
+              <a:shade val="50000"/>
+            </a:schemeClr>
+          </a:lnRef>
+          <a:fillRef idx="1">
+            <a:schemeClr val="accent1"/>
+          </a:fillRef>
+          <a:effectRef idx="0">
+            <a:schemeClr val="accent1"/>
+          </a:effectRef>
+          <a:fontRef idx="minor">
+            <a:schemeClr val="lt1"/>
+          </a:fontRef>
+        </p:style>
+        <p:txBody>
+          <a:bodyPr rtlCol="0" anchor="ctr"/>
+          <a:lstStyle/>
+          <a:p>
+            <a:pPr algn="ctr"/>
+            <a:endParaRPr lang="en-US"/>
+          </a:p>
+        </p:txBody>
+      </p:sp>
+      <p:sp>
+        <p:nvSpPr>
+          <p:cNvPr id="88" name="Isosceles Triangle 87"/>
+          <p:cNvSpPr>
+            <a:spLocks noChangeAspect="1"/>
+          </p:cNvSpPr>
+          <p:nvPr/>
+        </p:nvSpPr>
+        <p:spPr>
+          <a:xfrm rot="10800000">
+            <a:off x="2385778" y="852711"/>
+            <a:ext cx="91440" cy="42550"/>
+          </a:xfrm>
+          <a:prstGeom prst="triangle">
+            <a:avLst/>
+          </a:prstGeom>
+          <a:solidFill>
+            <a:srgbClr val="E2E6E6"/>
+          </a:solidFill>
+          <a:ln w="9525">
+            <a:noFill/>
+          </a:ln>
+          <a:scene3d>
+            <a:camera prst="orthographicFront"/>
+            <a:lightRig rig="threePt" dir="t"/>
+          </a:scene3d>
+          <a:sp3d>
+            <a:bevelT w="101600" h="25400"/>
+          </a:sp3d>
+        </p:spPr>
+        <p:style>
+          <a:lnRef idx="2">
+            <a:schemeClr val="accent1">
+              <a:shade val="50000"/>
+            </a:schemeClr>
+          </a:lnRef>
+          <a:fillRef idx="1">
+            <a:schemeClr val="accent1"/>
+          </a:fillRef>
+          <a:effectRef idx="0">
+            <a:schemeClr val="accent1"/>
+          </a:effectRef>
+          <a:fontRef idx="minor">
+            <a:schemeClr val="lt1"/>
+          </a:fontRef>
+        </p:style>
+        <p:txBody>
+          <a:bodyPr rtlCol="0" anchor="ctr"/>
+          <a:lstStyle/>
+          <a:p>
+            <a:pPr algn="ctr"/>
+            <a:endParaRPr lang="en-US"/>
+          </a:p>
+        </p:txBody>
+      </p:sp>
     </p:spTree>
     <p:extLst>
       <p:ext uri="{BB962C8B-B14F-4D97-AF65-F5344CB8AC3E}">

</xml_diff>

<commit_message>
changed style to be less greenish
</commit_message>
<xml_diff>
--- a/documents/design/webportal/Web Portal Design Graphics.pptx
+++ b/documents/design/webportal/Web Portal Design Graphics.pptx
@@ -5,17 +5,19 @@
     <p:sldMasterId id="2147483648" r:id="rId1"/>
   </p:sldMasterIdLst>
   <p:notesMasterIdLst>
-    <p:notesMasterId r:id="rId10"/>
+    <p:notesMasterId r:id="rId12"/>
   </p:notesMasterIdLst>
   <p:sldIdLst>
     <p:sldId id="266" r:id="rId2"/>
-    <p:sldId id="256" r:id="rId3"/>
-    <p:sldId id="259" r:id="rId4"/>
-    <p:sldId id="260" r:id="rId5"/>
-    <p:sldId id="262" r:id="rId6"/>
-    <p:sldId id="264" r:id="rId7"/>
-    <p:sldId id="265" r:id="rId8"/>
-    <p:sldId id="263" r:id="rId9"/>
+    <p:sldId id="267" r:id="rId3"/>
+    <p:sldId id="256" r:id="rId4"/>
+    <p:sldId id="259" r:id="rId5"/>
+    <p:sldId id="260" r:id="rId6"/>
+    <p:sldId id="262" r:id="rId7"/>
+    <p:sldId id="264" r:id="rId8"/>
+    <p:sldId id="265" r:id="rId9"/>
+    <p:sldId id="268" r:id="rId10"/>
+    <p:sldId id="263" r:id="rId11"/>
   </p:sldIdLst>
   <p:sldSz cx="9144000" cy="6858000" type="screen4x3"/>
   <p:notesSz cx="6858000" cy="9144000"/>
@@ -199,7 +201,7 @@
           <a:p>
             <a:fld id="{ABBC0DEB-B0BC-4CA7-A885-C7D164CEF9CA}" type="datetimeFigureOut">
               <a:rPr lang="en-US" smtClean="0"/>
-              <a:t>3/5/2012</a:t>
+              <a:t>3/30/2012</a:t>
             </a:fld>
             <a:endParaRPr lang="en-US"/>
           </a:p>
@@ -532,7 +534,7 @@
           <a:p>
             <a:fld id="{E09A9129-0AAA-418C-BAC9-61B57D0A0F98}" type="slidenum">
               <a:rPr lang="en-US" smtClean="0"/>
-              <a:t>2</a:t>
+              <a:t>3</a:t>
             </a:fld>
             <a:endParaRPr lang="en-US"/>
           </a:p>
@@ -732,7 +734,7 @@
           <a:p>
             <a:fld id="{EEED50E4-BD2F-46D6-A43A-366B2EDD972C}" type="datetimeFigureOut">
               <a:rPr lang="en-US" smtClean="0"/>
-              <a:t>3/5/2012</a:t>
+              <a:t>3/30/2012</a:t>
             </a:fld>
             <a:endParaRPr lang="en-US"/>
           </a:p>
@@ -902,7 +904,7 @@
           <a:p>
             <a:fld id="{EEED50E4-BD2F-46D6-A43A-366B2EDD972C}" type="datetimeFigureOut">
               <a:rPr lang="en-US" smtClean="0"/>
-              <a:t>3/5/2012</a:t>
+              <a:t>3/30/2012</a:t>
             </a:fld>
             <a:endParaRPr lang="en-US"/>
           </a:p>
@@ -1082,7 +1084,7 @@
           <a:p>
             <a:fld id="{EEED50E4-BD2F-46D6-A43A-366B2EDD972C}" type="datetimeFigureOut">
               <a:rPr lang="en-US" smtClean="0"/>
-              <a:t>3/5/2012</a:t>
+              <a:t>3/30/2012</a:t>
             </a:fld>
             <a:endParaRPr lang="en-US"/>
           </a:p>
@@ -1252,7 +1254,7 @@
           <a:p>
             <a:fld id="{EEED50E4-BD2F-46D6-A43A-366B2EDD972C}" type="datetimeFigureOut">
               <a:rPr lang="en-US" smtClean="0"/>
-              <a:t>3/5/2012</a:t>
+              <a:t>3/30/2012</a:t>
             </a:fld>
             <a:endParaRPr lang="en-US"/>
           </a:p>
@@ -1498,7 +1500,7 @@
           <a:p>
             <a:fld id="{EEED50E4-BD2F-46D6-A43A-366B2EDD972C}" type="datetimeFigureOut">
               <a:rPr lang="en-US" smtClean="0"/>
-              <a:t>3/5/2012</a:t>
+              <a:t>3/30/2012</a:t>
             </a:fld>
             <a:endParaRPr lang="en-US"/>
           </a:p>
@@ -1786,7 +1788,7 @@
           <a:p>
             <a:fld id="{EEED50E4-BD2F-46D6-A43A-366B2EDD972C}" type="datetimeFigureOut">
               <a:rPr lang="en-US" smtClean="0"/>
-              <a:t>3/5/2012</a:t>
+              <a:t>3/30/2012</a:t>
             </a:fld>
             <a:endParaRPr lang="en-US"/>
           </a:p>
@@ -2208,7 +2210,7 @@
           <a:p>
             <a:fld id="{EEED50E4-BD2F-46D6-A43A-366B2EDD972C}" type="datetimeFigureOut">
               <a:rPr lang="en-US" smtClean="0"/>
-              <a:t>3/5/2012</a:t>
+              <a:t>3/30/2012</a:t>
             </a:fld>
             <a:endParaRPr lang="en-US"/>
           </a:p>
@@ -2326,7 +2328,7 @@
           <a:p>
             <a:fld id="{EEED50E4-BD2F-46D6-A43A-366B2EDD972C}" type="datetimeFigureOut">
               <a:rPr lang="en-US" smtClean="0"/>
-              <a:t>3/5/2012</a:t>
+              <a:t>3/30/2012</a:t>
             </a:fld>
             <a:endParaRPr lang="en-US"/>
           </a:p>
@@ -2421,7 +2423,7 @@
           <a:p>
             <a:fld id="{EEED50E4-BD2F-46D6-A43A-366B2EDD972C}" type="datetimeFigureOut">
               <a:rPr lang="en-US" smtClean="0"/>
-              <a:t>3/5/2012</a:t>
+              <a:t>3/30/2012</a:t>
             </a:fld>
             <a:endParaRPr lang="en-US"/>
           </a:p>
@@ -2698,7 +2700,7 @@
           <a:p>
             <a:fld id="{EEED50E4-BD2F-46D6-A43A-366B2EDD972C}" type="datetimeFigureOut">
               <a:rPr lang="en-US" smtClean="0"/>
-              <a:t>3/5/2012</a:t>
+              <a:t>3/30/2012</a:t>
             </a:fld>
             <a:endParaRPr lang="en-US"/>
           </a:p>
@@ -2951,7 +2953,7 @@
           <a:p>
             <a:fld id="{EEED50E4-BD2F-46D6-A43A-366B2EDD972C}" type="datetimeFigureOut">
               <a:rPr lang="en-US" smtClean="0"/>
-              <a:t>3/5/2012</a:t>
+              <a:t>3/30/2012</a:t>
             </a:fld>
             <a:endParaRPr lang="en-US"/>
           </a:p>
@@ -3167,7 +3169,7 @@
           <a:p>
             <a:fld id="{EEED50E4-BD2F-46D6-A43A-366B2EDD972C}" type="datetimeFigureOut">
               <a:rPr lang="en-US" smtClean="0"/>
-              <a:t>3/5/2012</a:t>
+              <a:t>3/30/2012</a:t>
             </a:fld>
             <a:endParaRPr lang="en-US"/>
           </a:p>
@@ -3565,6 +3567,905 @@
             <a:avLst/>
           </a:prstGeom>
           <a:solidFill>
+            <a:srgbClr val="ECECE6"/>
+          </a:solidFill>
+          <a:ln>
+            <a:noFill/>
+          </a:ln>
+        </p:spPr>
+        <p:style>
+          <a:lnRef idx="2">
+            <a:schemeClr val="accent1">
+              <a:shade val="50000"/>
+            </a:schemeClr>
+          </a:lnRef>
+          <a:fillRef idx="1">
+            <a:schemeClr val="accent1"/>
+          </a:fillRef>
+          <a:effectRef idx="0">
+            <a:schemeClr val="accent1"/>
+          </a:effectRef>
+          <a:fontRef idx="minor">
+            <a:schemeClr val="lt1"/>
+          </a:fontRef>
+        </p:style>
+        <p:txBody>
+          <a:bodyPr rtlCol="0" anchor="ctr"/>
+          <a:lstStyle/>
+          <a:p>
+            <a:pPr algn="ctr"/>
+            <a:r>
+              <a:rPr lang="en-US" dirty="0" smtClean="0">
+                <a:solidFill>
+                  <a:schemeClr val="tx1"/>
+                </a:solidFill>
+              </a:rPr>
+              <a:t>#</a:t>
+            </a:r>
+            <a:r>
+              <a:rPr lang="en-US" dirty="0" smtClean="0">
+                <a:solidFill>
+                  <a:schemeClr val="tx1"/>
+                </a:solidFill>
+              </a:rPr>
+              <a:t>ECECE6</a:t>
+            </a:r>
+            <a:endParaRPr lang="en-US" dirty="0">
+              <a:solidFill>
+                <a:schemeClr val="tx1"/>
+              </a:solidFill>
+            </a:endParaRPr>
+          </a:p>
+        </p:txBody>
+      </p:sp>
+      <p:sp>
+        <p:nvSpPr>
+          <p:cNvPr id="3" name="Rounded Rectangle 2"/>
+          <p:cNvSpPr/>
+          <p:nvPr/>
+        </p:nvSpPr>
+        <p:spPr>
+          <a:xfrm>
+            <a:off x="393192" y="914400"/>
+            <a:ext cx="1828800" cy="457200"/>
+          </a:xfrm>
+          <a:prstGeom prst="roundRect">
+            <a:avLst/>
+          </a:prstGeom>
+          <a:solidFill>
+            <a:srgbClr val="DADAD2"/>
+          </a:solidFill>
+          <a:ln>
+            <a:noFill/>
+          </a:ln>
+        </p:spPr>
+        <p:style>
+          <a:lnRef idx="2">
+            <a:schemeClr val="accent1">
+              <a:shade val="50000"/>
+            </a:schemeClr>
+          </a:lnRef>
+          <a:fillRef idx="1">
+            <a:schemeClr val="accent1"/>
+          </a:fillRef>
+          <a:effectRef idx="0">
+            <a:schemeClr val="accent1"/>
+          </a:effectRef>
+          <a:fontRef idx="minor">
+            <a:schemeClr val="lt1"/>
+          </a:fontRef>
+        </p:style>
+        <p:txBody>
+          <a:bodyPr rtlCol="0" anchor="ctr"/>
+          <a:lstStyle/>
+          <a:p>
+            <a:pPr algn="ctr"/>
+            <a:r>
+              <a:rPr lang="en-US" dirty="0" smtClean="0">
+                <a:solidFill>
+                  <a:schemeClr val="tx1"/>
+                </a:solidFill>
+              </a:rPr>
+              <a:t>#</a:t>
+            </a:r>
+            <a:r>
+              <a:rPr lang="en-US" dirty="0" smtClean="0">
+                <a:solidFill>
+                  <a:schemeClr val="tx1"/>
+                </a:solidFill>
+              </a:rPr>
+              <a:t>DADAD2</a:t>
+            </a:r>
+            <a:endParaRPr lang="en-US" dirty="0">
+              <a:solidFill>
+                <a:schemeClr val="tx1"/>
+              </a:solidFill>
+            </a:endParaRPr>
+          </a:p>
+        </p:txBody>
+      </p:sp>
+      <p:sp>
+        <p:nvSpPr>
+          <p:cNvPr id="4" name="Rounded Rectangle 3"/>
+          <p:cNvSpPr/>
+          <p:nvPr/>
+        </p:nvSpPr>
+        <p:spPr>
+          <a:xfrm>
+            <a:off x="381000" y="1524000"/>
+            <a:ext cx="1828800" cy="457200"/>
+          </a:xfrm>
+          <a:prstGeom prst="roundRect">
+            <a:avLst/>
+          </a:prstGeom>
+          <a:solidFill>
+            <a:srgbClr val="C0C0B2"/>
+          </a:solidFill>
+          <a:ln>
+            <a:noFill/>
+          </a:ln>
+        </p:spPr>
+        <p:style>
+          <a:lnRef idx="2">
+            <a:schemeClr val="accent1">
+              <a:shade val="50000"/>
+            </a:schemeClr>
+          </a:lnRef>
+          <a:fillRef idx="1">
+            <a:schemeClr val="accent1"/>
+          </a:fillRef>
+          <a:effectRef idx="0">
+            <a:schemeClr val="accent1"/>
+          </a:effectRef>
+          <a:fontRef idx="minor">
+            <a:schemeClr val="lt1"/>
+          </a:fontRef>
+        </p:style>
+        <p:txBody>
+          <a:bodyPr rtlCol="0" anchor="ctr"/>
+          <a:lstStyle/>
+          <a:p>
+            <a:pPr algn="ctr"/>
+            <a:r>
+              <a:rPr lang="en-US" dirty="0" smtClean="0">
+                <a:solidFill>
+                  <a:schemeClr val="tx1"/>
+                </a:solidFill>
+              </a:rPr>
+              <a:t>#C0C0B2</a:t>
+            </a:r>
+            <a:endParaRPr lang="en-US" dirty="0">
+              <a:solidFill>
+                <a:schemeClr val="tx1"/>
+              </a:solidFill>
+            </a:endParaRPr>
+          </a:p>
+        </p:txBody>
+      </p:sp>
+      <p:sp>
+        <p:nvSpPr>
+          <p:cNvPr id="5" name="Rounded Rectangle 4"/>
+          <p:cNvSpPr/>
+          <p:nvPr/>
+        </p:nvSpPr>
+        <p:spPr>
+          <a:xfrm>
+            <a:off x="381000" y="2133600"/>
+            <a:ext cx="1828800" cy="457200"/>
+          </a:xfrm>
+          <a:prstGeom prst="roundRect">
+            <a:avLst/>
+          </a:prstGeom>
+          <a:solidFill>
+            <a:srgbClr val="7C7C70"/>
+          </a:solidFill>
+          <a:ln>
+            <a:noFill/>
+          </a:ln>
+        </p:spPr>
+        <p:style>
+          <a:lnRef idx="2">
+            <a:schemeClr val="accent1">
+              <a:shade val="50000"/>
+            </a:schemeClr>
+          </a:lnRef>
+          <a:fillRef idx="1">
+            <a:schemeClr val="accent1"/>
+          </a:fillRef>
+          <a:effectRef idx="0">
+            <a:schemeClr val="accent1"/>
+          </a:effectRef>
+          <a:fontRef idx="minor">
+            <a:schemeClr val="lt1"/>
+          </a:fontRef>
+        </p:style>
+        <p:txBody>
+          <a:bodyPr rtlCol="0" anchor="ctr"/>
+          <a:lstStyle/>
+          <a:p>
+            <a:pPr algn="ctr"/>
+            <a:r>
+              <a:rPr lang="en-US" dirty="0" smtClean="0">
+                <a:solidFill>
+                  <a:schemeClr val="tx1"/>
+                </a:solidFill>
+              </a:rPr>
+              <a:t>#7C7C70</a:t>
+            </a:r>
+            <a:endParaRPr lang="en-US" dirty="0">
+              <a:solidFill>
+                <a:schemeClr val="tx1"/>
+              </a:solidFill>
+            </a:endParaRPr>
+          </a:p>
+        </p:txBody>
+      </p:sp>
+      <p:sp>
+        <p:nvSpPr>
+          <p:cNvPr id="6" name="Rounded Rectangle 5"/>
+          <p:cNvSpPr/>
+          <p:nvPr/>
+        </p:nvSpPr>
+        <p:spPr>
+          <a:xfrm>
+            <a:off x="2514600" y="304800"/>
+            <a:ext cx="1828800" cy="457200"/>
+          </a:xfrm>
+          <a:prstGeom prst="roundRect">
+            <a:avLst/>
+          </a:prstGeom>
+          <a:solidFill>
+            <a:srgbClr val="E2E6E6"/>
+          </a:solidFill>
+          <a:ln>
+            <a:noFill/>
+          </a:ln>
+        </p:spPr>
+        <p:style>
+          <a:lnRef idx="2">
+            <a:schemeClr val="accent1">
+              <a:shade val="50000"/>
+            </a:schemeClr>
+          </a:lnRef>
+          <a:fillRef idx="1">
+            <a:schemeClr val="accent1"/>
+          </a:fillRef>
+          <a:effectRef idx="0">
+            <a:schemeClr val="accent1"/>
+          </a:effectRef>
+          <a:fontRef idx="minor">
+            <a:schemeClr val="lt1"/>
+          </a:fontRef>
+        </p:style>
+        <p:txBody>
+          <a:bodyPr rtlCol="0" anchor="ctr"/>
+          <a:lstStyle/>
+          <a:p>
+            <a:pPr algn="ctr"/>
+            <a:r>
+              <a:rPr lang="en-US" dirty="0" smtClean="0">
+                <a:solidFill>
+                  <a:schemeClr val="tx1"/>
+                </a:solidFill>
+              </a:rPr>
+              <a:t>#E2E6E6</a:t>
+            </a:r>
+            <a:endParaRPr lang="en-US" dirty="0">
+              <a:solidFill>
+                <a:schemeClr val="tx1"/>
+              </a:solidFill>
+            </a:endParaRPr>
+          </a:p>
+        </p:txBody>
+      </p:sp>
+      <p:sp>
+        <p:nvSpPr>
+          <p:cNvPr id="7" name="Rounded Rectangle 6"/>
+          <p:cNvSpPr/>
+          <p:nvPr/>
+        </p:nvSpPr>
+        <p:spPr>
+          <a:xfrm>
+            <a:off x="2514600" y="914400"/>
+            <a:ext cx="1828800" cy="457200"/>
+          </a:xfrm>
+          <a:prstGeom prst="roundRect">
+            <a:avLst/>
+          </a:prstGeom>
+          <a:solidFill>
+            <a:srgbClr val="AEC2D0"/>
+          </a:solidFill>
+          <a:ln>
+            <a:noFill/>
+          </a:ln>
+        </p:spPr>
+        <p:style>
+          <a:lnRef idx="2">
+            <a:schemeClr val="accent1">
+              <a:shade val="50000"/>
+            </a:schemeClr>
+          </a:lnRef>
+          <a:fillRef idx="1">
+            <a:schemeClr val="accent1"/>
+          </a:fillRef>
+          <a:effectRef idx="0">
+            <a:schemeClr val="accent1"/>
+          </a:effectRef>
+          <a:fontRef idx="minor">
+            <a:schemeClr val="lt1"/>
+          </a:fontRef>
+        </p:style>
+        <p:txBody>
+          <a:bodyPr rtlCol="0" anchor="ctr"/>
+          <a:lstStyle/>
+          <a:p>
+            <a:pPr algn="ctr"/>
+            <a:r>
+              <a:rPr lang="en-US" dirty="0" smtClean="0">
+                <a:solidFill>
+                  <a:schemeClr val="tx1"/>
+                </a:solidFill>
+              </a:rPr>
+              <a:t>#AEC2D0</a:t>
+            </a:r>
+            <a:endParaRPr lang="en-US" dirty="0">
+              <a:solidFill>
+                <a:schemeClr val="tx1"/>
+              </a:solidFill>
+            </a:endParaRPr>
+          </a:p>
+        </p:txBody>
+      </p:sp>
+      <p:sp>
+        <p:nvSpPr>
+          <p:cNvPr id="8" name="Rounded Rectangle 7"/>
+          <p:cNvSpPr/>
+          <p:nvPr/>
+        </p:nvSpPr>
+        <p:spPr>
+          <a:xfrm>
+            <a:off x="2514600" y="1524000"/>
+            <a:ext cx="1828800" cy="457200"/>
+          </a:xfrm>
+          <a:prstGeom prst="roundRect">
+            <a:avLst/>
+          </a:prstGeom>
+          <a:solidFill>
+            <a:srgbClr val="6D92AB"/>
+          </a:solidFill>
+          <a:ln>
+            <a:noFill/>
+          </a:ln>
+        </p:spPr>
+        <p:style>
+          <a:lnRef idx="2">
+            <a:schemeClr val="accent1">
+              <a:shade val="50000"/>
+            </a:schemeClr>
+          </a:lnRef>
+          <a:fillRef idx="1">
+            <a:schemeClr val="accent1"/>
+          </a:fillRef>
+          <a:effectRef idx="0">
+            <a:schemeClr val="accent1"/>
+          </a:effectRef>
+          <a:fontRef idx="minor">
+            <a:schemeClr val="lt1"/>
+          </a:fontRef>
+        </p:style>
+        <p:txBody>
+          <a:bodyPr rtlCol="0" anchor="ctr"/>
+          <a:lstStyle/>
+          <a:p>
+            <a:pPr algn="ctr"/>
+            <a:r>
+              <a:rPr lang="en-US" dirty="0" smtClean="0">
+                <a:solidFill>
+                  <a:schemeClr val="tx1"/>
+                </a:solidFill>
+              </a:rPr>
+              <a:t>#6D92AB</a:t>
+            </a:r>
+            <a:endParaRPr lang="en-US" dirty="0">
+              <a:solidFill>
+                <a:schemeClr val="tx1"/>
+              </a:solidFill>
+            </a:endParaRPr>
+          </a:p>
+        </p:txBody>
+      </p:sp>
+      <p:sp>
+        <p:nvSpPr>
+          <p:cNvPr id="9" name="Rounded Rectangle 8"/>
+          <p:cNvSpPr/>
+          <p:nvPr/>
+        </p:nvSpPr>
+        <p:spPr>
+          <a:xfrm>
+            <a:off x="2514600" y="2133600"/>
+            <a:ext cx="1828800" cy="457200"/>
+          </a:xfrm>
+          <a:prstGeom prst="roundRect">
+            <a:avLst/>
+          </a:prstGeom>
+          <a:solidFill>
+            <a:srgbClr val="50738A"/>
+          </a:solidFill>
+          <a:ln>
+            <a:noFill/>
+          </a:ln>
+        </p:spPr>
+        <p:style>
+          <a:lnRef idx="2">
+            <a:schemeClr val="accent1">
+              <a:shade val="50000"/>
+            </a:schemeClr>
+          </a:lnRef>
+          <a:fillRef idx="1">
+            <a:schemeClr val="accent1"/>
+          </a:fillRef>
+          <a:effectRef idx="0">
+            <a:schemeClr val="accent1"/>
+          </a:effectRef>
+          <a:fontRef idx="minor">
+            <a:schemeClr val="lt1"/>
+          </a:fontRef>
+        </p:style>
+        <p:txBody>
+          <a:bodyPr rtlCol="0" anchor="ctr"/>
+          <a:lstStyle/>
+          <a:p>
+            <a:pPr algn="ctr"/>
+            <a:r>
+              <a:rPr lang="en-US" dirty="0" smtClean="0">
+                <a:solidFill>
+                  <a:schemeClr val="tx1"/>
+                </a:solidFill>
+              </a:rPr>
+              <a:t>#50738A</a:t>
+            </a:r>
+            <a:endParaRPr lang="en-US" dirty="0">
+              <a:solidFill>
+                <a:schemeClr val="tx1"/>
+              </a:solidFill>
+            </a:endParaRPr>
+          </a:p>
+        </p:txBody>
+      </p:sp>
+      <p:sp>
+        <p:nvSpPr>
+          <p:cNvPr id="10" name="Rounded Rectangle 9"/>
+          <p:cNvSpPr/>
+          <p:nvPr/>
+        </p:nvSpPr>
+        <p:spPr>
+          <a:xfrm>
+            <a:off x="4648200" y="304800"/>
+            <a:ext cx="1828800" cy="457200"/>
+          </a:xfrm>
+          <a:prstGeom prst="roundRect">
+            <a:avLst/>
+          </a:prstGeom>
+          <a:solidFill>
+            <a:srgbClr val="F4F2E0"/>
+          </a:solidFill>
+          <a:ln>
+            <a:noFill/>
+          </a:ln>
+        </p:spPr>
+        <p:style>
+          <a:lnRef idx="2">
+            <a:schemeClr val="accent1">
+              <a:shade val="50000"/>
+            </a:schemeClr>
+          </a:lnRef>
+          <a:fillRef idx="1">
+            <a:schemeClr val="accent1"/>
+          </a:fillRef>
+          <a:effectRef idx="0">
+            <a:schemeClr val="accent1"/>
+          </a:effectRef>
+          <a:fontRef idx="minor">
+            <a:schemeClr val="lt1"/>
+          </a:fontRef>
+        </p:style>
+        <p:txBody>
+          <a:bodyPr rtlCol="0" anchor="ctr"/>
+          <a:lstStyle/>
+          <a:p>
+            <a:pPr algn="ctr"/>
+            <a:r>
+              <a:rPr lang="en-US" dirty="0">
+                <a:solidFill>
+                  <a:schemeClr val="tx1"/>
+                </a:solidFill>
+              </a:rPr>
+              <a:t>#F4F2E0</a:t>
+            </a:r>
+            <a:endParaRPr lang="en-US" dirty="0">
+              <a:solidFill>
+                <a:schemeClr val="tx1"/>
+              </a:solidFill>
+            </a:endParaRPr>
+          </a:p>
+        </p:txBody>
+      </p:sp>
+      <p:sp>
+        <p:nvSpPr>
+          <p:cNvPr id="11" name="Rounded Rectangle 10"/>
+          <p:cNvSpPr/>
+          <p:nvPr/>
+        </p:nvSpPr>
+        <p:spPr>
+          <a:xfrm>
+            <a:off x="4648200" y="914400"/>
+            <a:ext cx="1828800" cy="457200"/>
+          </a:xfrm>
+          <a:prstGeom prst="roundRect">
+            <a:avLst/>
+          </a:prstGeom>
+          <a:solidFill>
+            <a:srgbClr val="ECE6C8"/>
+          </a:solidFill>
+          <a:ln>
+            <a:noFill/>
+          </a:ln>
+        </p:spPr>
+        <p:style>
+          <a:lnRef idx="2">
+            <a:schemeClr val="accent1">
+              <a:shade val="50000"/>
+            </a:schemeClr>
+          </a:lnRef>
+          <a:fillRef idx="1">
+            <a:schemeClr val="accent1"/>
+          </a:fillRef>
+          <a:effectRef idx="0">
+            <a:schemeClr val="accent1"/>
+          </a:effectRef>
+          <a:fontRef idx="minor">
+            <a:schemeClr val="lt1"/>
+          </a:fontRef>
+        </p:style>
+        <p:txBody>
+          <a:bodyPr rtlCol="0" anchor="ctr"/>
+          <a:lstStyle/>
+          <a:p>
+            <a:pPr algn="ctr"/>
+            <a:r>
+              <a:rPr lang="en-US" dirty="0">
+                <a:solidFill>
+                  <a:schemeClr val="tx1"/>
+                </a:solidFill>
+              </a:rPr>
+              <a:t>#</a:t>
+            </a:r>
+            <a:r>
+              <a:rPr lang="en-US" dirty="0" smtClean="0">
+                <a:solidFill>
+                  <a:schemeClr val="tx1"/>
+                </a:solidFill>
+              </a:rPr>
+              <a:t>ECE6C8</a:t>
+            </a:r>
+            <a:endParaRPr lang="en-US" dirty="0">
+              <a:solidFill>
+                <a:schemeClr val="tx1"/>
+              </a:solidFill>
+            </a:endParaRPr>
+          </a:p>
+        </p:txBody>
+      </p:sp>
+    </p:spTree>
+    <p:extLst>
+      <p:ext uri="{BB962C8B-B14F-4D97-AF65-F5344CB8AC3E}">
+        <p14:creationId xmlns:p14="http://schemas.microsoft.com/office/powerpoint/2010/main" val="3503806962"/>
+      </p:ext>
+    </p:extLst>
+  </p:cSld>
+  <p:clrMapOvr>
+    <a:masterClrMapping/>
+  </p:clrMapOvr>
+</p:sld>
+</file>
+
+<file path=ppt/slides/slide10.xml><?xml version="1.0" encoding="utf-8"?>
+<p:sld xmlns:a="http://schemas.openxmlformats.org/drawingml/2006/main" xmlns:r="http://schemas.openxmlformats.org/officeDocument/2006/relationships" xmlns:p="http://schemas.openxmlformats.org/presentationml/2006/main">
+  <p:cSld>
+    <p:spTree>
+      <p:nvGrpSpPr>
+        <p:cNvPr id="1" name=""/>
+        <p:cNvGrpSpPr/>
+        <p:nvPr/>
+      </p:nvGrpSpPr>
+      <p:grpSpPr>
+        <a:xfrm>
+          <a:off x="0" y="0"/>
+          <a:ext cx="0" cy="0"/>
+          <a:chOff x="0" y="0"/>
+          <a:chExt cx="0" cy="0"/>
+        </a:xfrm>
+      </p:grpSpPr>
+      <p:sp>
+        <p:nvSpPr>
+          <p:cNvPr id="62" name="Rounded Rectangle 61"/>
+          <p:cNvSpPr/>
+          <p:nvPr/>
+        </p:nvSpPr>
+        <p:spPr>
+          <a:xfrm>
+            <a:off x="609600" y="533400"/>
+            <a:ext cx="1634897" cy="1447800"/>
+          </a:xfrm>
+          <a:prstGeom prst="roundRect">
+            <a:avLst/>
+          </a:prstGeom>
+          <a:solidFill>
+            <a:srgbClr val="4172AD"/>
+          </a:solidFill>
+        </p:spPr>
+        <p:style>
+          <a:lnRef idx="2">
+            <a:schemeClr val="accent1">
+              <a:shade val="50000"/>
+            </a:schemeClr>
+          </a:lnRef>
+          <a:fillRef idx="1">
+            <a:schemeClr val="accent1"/>
+          </a:fillRef>
+          <a:effectRef idx="0">
+            <a:schemeClr val="accent1"/>
+          </a:effectRef>
+          <a:fontRef idx="minor">
+            <a:schemeClr val="lt1"/>
+          </a:fontRef>
+        </p:style>
+        <p:txBody>
+          <a:bodyPr rtlCol="0" anchor="ctr"/>
+          <a:lstStyle/>
+          <a:p>
+            <a:pPr algn="ctr"/>
+            <a:endParaRPr lang="en-US"/>
+          </a:p>
+        </p:txBody>
+      </p:sp>
+      <p:sp>
+        <p:nvSpPr>
+          <p:cNvPr id="63" name="TextBox 62"/>
+          <p:cNvSpPr txBox="1"/>
+          <p:nvPr/>
+        </p:nvSpPr>
+        <p:spPr>
+          <a:xfrm>
+            <a:off x="685800" y="533400"/>
+            <a:ext cx="2057400" cy="1569660"/>
+          </a:xfrm>
+          <a:prstGeom prst="rect">
+            <a:avLst/>
+          </a:prstGeom>
+          <a:noFill/>
+        </p:spPr>
+        <p:txBody>
+          <a:bodyPr wrap="square" rtlCol="0">
+            <a:spAutoFit/>
+          </a:bodyPr>
+          <a:lstStyle/>
+          <a:p>
+            <a:r>
+              <a:rPr lang="en-US" sz="9600" i="1" dirty="0" smtClean="0">
+                <a:solidFill>
+                  <a:srgbClr val="FFC000"/>
+                </a:solidFill>
+                <a:latin typeface="Elephant" pitchFamily="18" charset="0"/>
+              </a:rPr>
+              <a:t>D</a:t>
+            </a:r>
+            <a:endParaRPr lang="en-US" sz="9600" i="1" dirty="0">
+              <a:solidFill>
+                <a:srgbClr val="FFC000"/>
+              </a:solidFill>
+              <a:latin typeface="Elephant" pitchFamily="18" charset="0"/>
+            </a:endParaRPr>
+          </a:p>
+        </p:txBody>
+      </p:sp>
+      <p:sp>
+        <p:nvSpPr>
+          <p:cNvPr id="64" name="Isosceles Triangle 63"/>
+          <p:cNvSpPr/>
+          <p:nvPr/>
+        </p:nvSpPr>
+        <p:spPr>
+          <a:xfrm flipV="1">
+            <a:off x="1859595" y="840079"/>
+            <a:ext cx="1084378" cy="71452"/>
+          </a:xfrm>
+          <a:prstGeom prst="triangle">
+            <a:avLst>
+              <a:gd name="adj" fmla="val 19834"/>
+            </a:avLst>
+          </a:prstGeom>
+          <a:solidFill>
+            <a:srgbClr val="FFC000"/>
+          </a:solidFill>
+          <a:ln>
+            <a:noFill/>
+          </a:ln>
+        </p:spPr>
+        <p:style>
+          <a:lnRef idx="2">
+            <a:schemeClr val="accent1">
+              <a:shade val="50000"/>
+            </a:schemeClr>
+          </a:lnRef>
+          <a:fillRef idx="1">
+            <a:schemeClr val="accent1"/>
+          </a:fillRef>
+          <a:effectRef idx="0">
+            <a:schemeClr val="accent1"/>
+          </a:effectRef>
+          <a:fontRef idx="minor">
+            <a:schemeClr val="lt1"/>
+          </a:fontRef>
+        </p:style>
+        <p:txBody>
+          <a:bodyPr rtlCol="0" anchor="ctr"/>
+          <a:lstStyle/>
+          <a:p>
+            <a:pPr algn="ctr"/>
+            <a:endParaRPr lang="en-US" dirty="0"/>
+          </a:p>
+        </p:txBody>
+      </p:sp>
+      <p:sp>
+        <p:nvSpPr>
+          <p:cNvPr id="65" name="Isosceles Triangle 64"/>
+          <p:cNvSpPr/>
+          <p:nvPr/>
+        </p:nvSpPr>
+        <p:spPr>
+          <a:xfrm flipV="1">
+            <a:off x="1976370" y="1016229"/>
+            <a:ext cx="731205" cy="71452"/>
+          </a:xfrm>
+          <a:prstGeom prst="triangle">
+            <a:avLst>
+              <a:gd name="adj" fmla="val 19834"/>
+            </a:avLst>
+          </a:prstGeom>
+          <a:solidFill>
+            <a:srgbClr val="FFC000"/>
+          </a:solidFill>
+          <a:ln>
+            <a:noFill/>
+          </a:ln>
+        </p:spPr>
+        <p:style>
+          <a:lnRef idx="2">
+            <a:schemeClr val="accent1">
+              <a:shade val="50000"/>
+            </a:schemeClr>
+          </a:lnRef>
+          <a:fillRef idx="1">
+            <a:schemeClr val="accent1"/>
+          </a:fillRef>
+          <a:effectRef idx="0">
+            <a:schemeClr val="accent1"/>
+          </a:effectRef>
+          <a:fontRef idx="minor">
+            <a:schemeClr val="lt1"/>
+          </a:fontRef>
+        </p:style>
+        <p:txBody>
+          <a:bodyPr rtlCol="0" anchor="ctr"/>
+          <a:lstStyle/>
+          <a:p>
+            <a:pPr algn="ctr"/>
+            <a:endParaRPr lang="en-US" dirty="0"/>
+          </a:p>
+        </p:txBody>
+      </p:sp>
+      <p:sp>
+        <p:nvSpPr>
+          <p:cNvPr id="66" name="Isosceles Triangle 65"/>
+          <p:cNvSpPr/>
+          <p:nvPr/>
+        </p:nvSpPr>
+        <p:spPr>
+          <a:xfrm flipV="1">
+            <a:off x="2069395" y="1192379"/>
+            <a:ext cx="350205" cy="71452"/>
+          </a:xfrm>
+          <a:prstGeom prst="triangle">
+            <a:avLst>
+              <a:gd name="adj" fmla="val 19834"/>
+            </a:avLst>
+          </a:prstGeom>
+          <a:solidFill>
+            <a:srgbClr val="FFC000"/>
+          </a:solidFill>
+          <a:ln>
+            <a:noFill/>
+          </a:ln>
+        </p:spPr>
+        <p:style>
+          <a:lnRef idx="2">
+            <a:schemeClr val="accent1">
+              <a:shade val="50000"/>
+            </a:schemeClr>
+          </a:lnRef>
+          <a:fillRef idx="1">
+            <a:schemeClr val="accent1"/>
+          </a:fillRef>
+          <a:effectRef idx="0">
+            <a:schemeClr val="accent1"/>
+          </a:effectRef>
+          <a:fontRef idx="minor">
+            <a:schemeClr val="lt1"/>
+          </a:fontRef>
+        </p:style>
+        <p:txBody>
+          <a:bodyPr rtlCol="0" anchor="ctr"/>
+          <a:lstStyle/>
+          <a:p>
+            <a:pPr algn="ctr"/>
+            <a:endParaRPr lang="en-US" dirty="0"/>
+          </a:p>
+        </p:txBody>
+      </p:sp>
+    </p:spTree>
+    <p:extLst>
+      <p:ext uri="{BB962C8B-B14F-4D97-AF65-F5344CB8AC3E}">
+        <p14:creationId xmlns:p14="http://schemas.microsoft.com/office/powerpoint/2010/main" val="4132517028"/>
+      </p:ext>
+    </p:extLst>
+  </p:cSld>
+  <p:clrMapOvr>
+    <a:masterClrMapping/>
+  </p:clrMapOvr>
+</p:sld>
+</file>
+
+<file path=ppt/slides/slide2.xml><?xml version="1.0" encoding="utf-8"?>
+<p:sld xmlns:a="http://schemas.openxmlformats.org/drawingml/2006/main" xmlns:r="http://schemas.openxmlformats.org/officeDocument/2006/relationships" xmlns:p="http://schemas.openxmlformats.org/presentationml/2006/main">
+  <p:cSld>
+    <p:bg>
+      <p:bgPr>
+        <a:solidFill>
+          <a:schemeClr val="bg1"/>
+        </a:solidFill>
+        <a:effectLst/>
+      </p:bgPr>
+    </p:bg>
+    <p:spTree>
+      <p:nvGrpSpPr>
+        <p:cNvPr id="1" name=""/>
+        <p:cNvGrpSpPr/>
+        <p:nvPr/>
+      </p:nvGrpSpPr>
+      <p:grpSpPr>
+        <a:xfrm>
+          <a:off x="0" y="0"/>
+          <a:ext cx="0" cy="0"/>
+          <a:chOff x="0" y="0"/>
+          <a:chExt cx="0" cy="0"/>
+        </a:xfrm>
+      </p:grpSpPr>
+      <p:sp>
+        <p:nvSpPr>
+          <p:cNvPr id="2" name="Rounded Rectangle 1"/>
+          <p:cNvSpPr/>
+          <p:nvPr/>
+        </p:nvSpPr>
+        <p:spPr>
+          <a:xfrm>
+            <a:off x="381000" y="304800"/>
+            <a:ext cx="1828800" cy="457200"/>
+          </a:xfrm>
+          <a:prstGeom prst="roundRect">
+            <a:avLst/>
+          </a:prstGeom>
+          <a:solidFill>
             <a:srgbClr val="EEECE1"/>
           </a:solidFill>
           <a:ln>
@@ -4123,7 +5024,7 @@
     </p:spTree>
     <p:extLst>
       <p:ext uri="{BB962C8B-B14F-4D97-AF65-F5344CB8AC3E}">
-        <p14:creationId xmlns:p14="http://schemas.microsoft.com/office/powerpoint/2010/main" val="3503806962"/>
+        <p14:creationId xmlns:p14="http://schemas.microsoft.com/office/powerpoint/2010/main" val="1640947105"/>
       </p:ext>
     </p:extLst>
   </p:cSld>
@@ -4133,7 +5034,7 @@
 </p:sld>
 </file>
 
-<file path=ppt/slides/slide2.xml><?xml version="1.0" encoding="utf-8"?>
+<file path=ppt/slides/slide3.xml><?xml version="1.0" encoding="utf-8"?>
 <p:sld xmlns:a="http://schemas.openxmlformats.org/drawingml/2006/main" xmlns:r="http://schemas.openxmlformats.org/officeDocument/2006/relationships" xmlns:p="http://schemas.openxmlformats.org/presentationml/2006/main">
   <p:cSld>
     <p:spTree>
@@ -4630,7 +5531,7 @@
 </p:sld>
 </file>
 
-<file path=ppt/slides/slide3.xml><?xml version="1.0" encoding="utf-8"?>
+<file path=ppt/slides/slide4.xml><?xml version="1.0" encoding="utf-8"?>
 <p:sld xmlns:a="http://schemas.openxmlformats.org/drawingml/2006/main" xmlns:r="http://schemas.openxmlformats.org/officeDocument/2006/relationships" xmlns:p="http://schemas.openxmlformats.org/presentationml/2006/main">
   <p:cSld>
     <p:spTree>
@@ -7383,7 +8284,7 @@
 </p:sld>
 </file>
 
-<file path=ppt/slides/slide4.xml><?xml version="1.0" encoding="utf-8"?>
+<file path=ppt/slides/slide5.xml><?xml version="1.0" encoding="utf-8"?>
 <p:sld xmlns:a="http://schemas.openxmlformats.org/drawingml/2006/main" xmlns:r="http://schemas.openxmlformats.org/officeDocument/2006/relationships" xmlns:p="http://schemas.openxmlformats.org/presentationml/2006/main">
   <p:cSld>
     <p:spTree>
@@ -9963,7 +10864,7 @@
 </p:sld>
 </file>
 
-<file path=ppt/slides/slide5.xml><?xml version="1.0" encoding="utf-8"?>
+<file path=ppt/slides/slide6.xml><?xml version="1.0" encoding="utf-8"?>
 <p:sld xmlns:a="http://schemas.openxmlformats.org/drawingml/2006/main" xmlns:r="http://schemas.openxmlformats.org/officeDocument/2006/relationships" xmlns:p="http://schemas.openxmlformats.org/presentationml/2006/main">
   <p:cSld>
     <p:spTree>
@@ -12542,7 +13443,7 @@
 </p:sld>
 </file>
 
-<file path=ppt/slides/slide6.xml><?xml version="1.0" encoding="utf-8"?>
+<file path=ppt/slides/slide7.xml><?xml version="1.0" encoding="utf-8"?>
 <p:sld xmlns:a="http://schemas.openxmlformats.org/drawingml/2006/main" xmlns:r="http://schemas.openxmlformats.org/officeDocument/2006/relationships" xmlns:p="http://schemas.openxmlformats.org/presentationml/2006/main">
   <p:cSld>
     <p:spTree>
@@ -15526,7 +16427,7 @@
 </p:sld>
 </file>
 
-<file path=ppt/slides/slide7.xml><?xml version="1.0" encoding="utf-8"?>
+<file path=ppt/slides/slide8.xml><?xml version="1.0" encoding="utf-8"?>
 <p:sld xmlns:a="http://schemas.openxmlformats.org/drawingml/2006/main" xmlns:r="http://schemas.openxmlformats.org/officeDocument/2006/relationships" xmlns:p="http://schemas.openxmlformats.org/presentationml/2006/main">
   <p:cSld>
     <p:spTree>
@@ -15810,7 +16711,7 @@
 </p:sld>
 </file>
 
-<file path=ppt/slides/slide8.xml><?xml version="1.0" encoding="utf-8"?>
+<file path=ppt/slides/slide9.xml><?xml version="1.0" encoding="utf-8"?>
 <p:sld xmlns:a="http://schemas.openxmlformats.org/drawingml/2006/main" xmlns:r="http://schemas.openxmlformats.org/officeDocument/2006/relationships" xmlns:p="http://schemas.openxmlformats.org/presentationml/2006/main">
   <p:cSld>
     <p:spTree>
@@ -15829,21 +16730,26 @@
       </p:grpSpPr>
       <p:sp>
         <p:nvSpPr>
-          <p:cNvPr id="62" name="Rounded Rectangle 61"/>
+          <p:cNvPr id="68" name="Rounded Rectangle 67"/>
           <p:cNvSpPr/>
           <p:nvPr/>
         </p:nvSpPr>
         <p:spPr>
           <a:xfrm>
-            <a:off x="609600" y="533400"/>
-            <a:ext cx="1634897" cy="1447800"/>
+            <a:off x="812827" y="268961"/>
+            <a:ext cx="3933962" cy="3431030"/>
           </a:xfrm>
           <a:prstGeom prst="roundRect">
             <a:avLst/>
           </a:prstGeom>
           <a:solidFill>
-            <a:srgbClr val="4172AD"/>
+            <a:schemeClr val="tx1"/>
           </a:solidFill>
+          <a:ln w="6350">
+            <a:solidFill>
+              <a:schemeClr val="tx1"/>
+            </a:solidFill>
+          </a:ln>
         </p:spPr>
         <p:style>
           <a:lnRef idx="2">
@@ -15872,62 +16778,180 @@
       </p:sp>
       <p:sp>
         <p:nvSpPr>
-          <p:cNvPr id="63" name="TextBox 62"/>
-          <p:cNvSpPr txBox="1"/>
+          <p:cNvPr id="7" name="Rounded Rectangle 6"/>
+          <p:cNvSpPr/>
           <p:nvPr/>
         </p:nvSpPr>
         <p:spPr>
           <a:xfrm>
-            <a:off x="685800" y="533400"/>
-            <a:ext cx="2057400" cy="1569660"/>
+            <a:off x="1186432" y="2514600"/>
+            <a:ext cx="3200400" cy="868680"/>
+          </a:xfrm>
+          <a:prstGeom prst="roundRect">
+            <a:avLst>
+              <a:gd name="adj" fmla="val 1222"/>
+            </a:avLst>
+          </a:prstGeom>
+          <a:solidFill>
+            <a:srgbClr val="ECECE6"/>
+          </a:solidFill>
+          <a:ln>
+            <a:noFill/>
+          </a:ln>
+          <a:effectLst>
+            <a:outerShdw blurRad="25400" dist="12700" dir="2700000" algn="ctr" rotWithShape="0">
+              <a:schemeClr val="tx1">
+                <a:lumMod val="65000"/>
+                <a:lumOff val="35000"/>
+                <a:alpha val="40000"/>
+              </a:schemeClr>
+            </a:outerShdw>
+          </a:effectLst>
+        </p:spPr>
+        <p:style>
+          <a:lnRef idx="2">
+            <a:schemeClr val="accent1">
+              <a:shade val="50000"/>
+            </a:schemeClr>
+          </a:lnRef>
+          <a:fillRef idx="1">
+            <a:schemeClr val="accent1"/>
+          </a:fillRef>
+          <a:effectRef idx="0">
+            <a:schemeClr val="accent1"/>
+          </a:effectRef>
+          <a:fontRef idx="minor">
+            <a:schemeClr val="lt1"/>
+          </a:fontRef>
+        </p:style>
+        <p:txBody>
+          <a:bodyPr rtlCol="0" anchor="ctr"/>
+          <a:lstStyle/>
+          <a:p>
+            <a:pPr algn="ctr"/>
+            <a:endParaRPr lang="en-US"/>
+          </a:p>
+        </p:txBody>
+      </p:sp>
+      <p:sp>
+        <p:nvSpPr>
+          <p:cNvPr id="66" name="Rounded Rectangle 65"/>
+          <p:cNvSpPr/>
+          <p:nvPr/>
+        </p:nvSpPr>
+        <p:spPr>
+          <a:xfrm>
+            <a:off x="772103" y="4666812"/>
+            <a:ext cx="3933962" cy="943383"/>
+          </a:xfrm>
+          <a:prstGeom prst="roundRect">
+            <a:avLst/>
+          </a:prstGeom>
+          <a:solidFill>
+            <a:schemeClr val="tx1"/>
+          </a:solidFill>
+          <a:ln w="6350">
+            <a:solidFill>
+              <a:schemeClr val="tx1"/>
+            </a:solidFill>
+          </a:ln>
+        </p:spPr>
+        <p:style>
+          <a:lnRef idx="2">
+            <a:schemeClr val="accent1">
+              <a:shade val="50000"/>
+            </a:schemeClr>
+          </a:lnRef>
+          <a:fillRef idx="1">
+            <a:schemeClr val="accent1"/>
+          </a:fillRef>
+          <a:effectRef idx="0">
+            <a:schemeClr val="accent1"/>
+          </a:effectRef>
+          <a:fontRef idx="minor">
+            <a:schemeClr val="lt1"/>
+          </a:fontRef>
+        </p:style>
+        <p:txBody>
+          <a:bodyPr rtlCol="0" anchor="ctr"/>
+          <a:lstStyle/>
+          <a:p>
+            <a:pPr algn="ctr"/>
+            <a:endParaRPr lang="en-US"/>
+          </a:p>
+        </p:txBody>
+      </p:sp>
+      <p:sp>
+        <p:nvSpPr>
+          <p:cNvPr id="70" name="Rounded Rectangle 69"/>
+          <p:cNvSpPr/>
+          <p:nvPr/>
+        </p:nvSpPr>
+        <p:spPr>
+          <a:xfrm>
+            <a:off x="1186432" y="4819212"/>
+            <a:ext cx="3200400" cy="486183"/>
+          </a:xfrm>
+          <a:prstGeom prst="roundRect">
+            <a:avLst>
+              <a:gd name="adj" fmla="val 7568"/>
+            </a:avLst>
+          </a:prstGeom>
+          <a:solidFill>
+            <a:srgbClr val="ECECE6"/>
+          </a:solidFill>
+          <a:ln>
+            <a:noFill/>
+          </a:ln>
+          <a:effectLst>
+            <a:outerShdw blurRad="63500" dist="12700" dir="2700000" algn="ctr" rotWithShape="0">
+              <a:srgbClr val="595959">
+                <a:alpha val="40000"/>
+              </a:srgbClr>
+            </a:outerShdw>
+          </a:effectLst>
+        </p:spPr>
+        <p:style>
+          <a:lnRef idx="2">
+            <a:schemeClr val="accent1">
+              <a:shade val="50000"/>
+            </a:schemeClr>
+          </a:lnRef>
+          <a:fillRef idx="1">
+            <a:schemeClr val="accent1"/>
+          </a:fillRef>
+          <a:effectRef idx="0">
+            <a:schemeClr val="accent1"/>
+          </a:effectRef>
+          <a:fontRef idx="minor">
+            <a:schemeClr val="lt1"/>
+          </a:fontRef>
+        </p:style>
+        <p:txBody>
+          <a:bodyPr rtlCol="0" anchor="ctr"/>
+          <a:lstStyle/>
+          <a:p>
+            <a:pPr algn="ctr"/>
+            <a:endParaRPr lang="en-US"/>
+          </a:p>
+        </p:txBody>
+      </p:sp>
+      <p:sp>
+        <p:nvSpPr>
+          <p:cNvPr id="71" name="Rectangle 70"/>
+          <p:cNvSpPr/>
+          <p:nvPr/>
+        </p:nvSpPr>
+        <p:spPr>
+          <a:xfrm>
+            <a:off x="921223" y="4743013"/>
+            <a:ext cx="3581401" cy="484153"/>
           </a:xfrm>
           <a:prstGeom prst="rect">
             <a:avLst/>
           </a:prstGeom>
-          <a:noFill/>
-        </p:spPr>
-        <p:txBody>
-          <a:bodyPr wrap="square" rtlCol="0">
-            <a:spAutoFit/>
-          </a:bodyPr>
-          <a:lstStyle/>
-          <a:p>
-            <a:r>
-              <a:rPr lang="en-US" sz="9600" i="1" dirty="0" smtClean="0">
-                <a:solidFill>
-                  <a:srgbClr val="FFC000"/>
-                </a:solidFill>
-                <a:latin typeface="Elephant" pitchFamily="18" charset="0"/>
-              </a:rPr>
-              <a:t>D</a:t>
-            </a:r>
-            <a:endParaRPr lang="en-US" sz="9600" i="1" dirty="0">
-              <a:solidFill>
-                <a:srgbClr val="FFC000"/>
-              </a:solidFill>
-              <a:latin typeface="Elephant" pitchFamily="18" charset="0"/>
-            </a:endParaRPr>
-          </a:p>
-        </p:txBody>
-      </p:sp>
-      <p:sp>
-        <p:nvSpPr>
-          <p:cNvPr id="64" name="Isosceles Triangle 63"/>
-          <p:cNvSpPr/>
-          <p:nvPr/>
-        </p:nvSpPr>
-        <p:spPr>
-          <a:xfrm flipV="1">
-            <a:off x="1859595" y="840079"/>
-            <a:ext cx="1084378" cy="71452"/>
-          </a:xfrm>
-          <a:prstGeom prst="triangle">
-            <a:avLst>
-              <a:gd name="adj" fmla="val 19834"/>
-            </a:avLst>
-          </a:prstGeom>
           <a:solidFill>
-            <a:srgbClr val="FFC000"/>
+            <a:schemeClr val="tx1"/>
           </a:solidFill>
           <a:ln>
             <a:noFill/>
@@ -15954,110 +16978,14 @@
           <a:lstStyle/>
           <a:p>
             <a:pPr algn="ctr"/>
-            <a:endParaRPr lang="en-US" dirty="0"/>
-          </a:p>
-        </p:txBody>
-      </p:sp>
-      <p:sp>
-        <p:nvSpPr>
-          <p:cNvPr id="65" name="Isosceles Triangle 64"/>
-          <p:cNvSpPr/>
-          <p:nvPr/>
-        </p:nvSpPr>
-        <p:spPr>
-          <a:xfrm flipV="1">
-            <a:off x="1976370" y="1016229"/>
-            <a:ext cx="731205" cy="71452"/>
-          </a:xfrm>
-          <a:prstGeom prst="triangle">
-            <a:avLst>
-              <a:gd name="adj" fmla="val 19834"/>
-            </a:avLst>
-          </a:prstGeom>
-          <a:solidFill>
-            <a:srgbClr val="FFC000"/>
-          </a:solidFill>
-          <a:ln>
-            <a:noFill/>
-          </a:ln>
-        </p:spPr>
-        <p:style>
-          <a:lnRef idx="2">
-            <a:schemeClr val="accent1">
-              <a:shade val="50000"/>
-            </a:schemeClr>
-          </a:lnRef>
-          <a:fillRef idx="1">
-            <a:schemeClr val="accent1"/>
-          </a:fillRef>
-          <a:effectRef idx="0">
-            <a:schemeClr val="accent1"/>
-          </a:effectRef>
-          <a:fontRef idx="minor">
-            <a:schemeClr val="lt1"/>
-          </a:fontRef>
-        </p:style>
-        <p:txBody>
-          <a:bodyPr rtlCol="0" anchor="ctr"/>
-          <a:lstStyle/>
-          <a:p>
-            <a:pPr algn="ctr"/>
-            <a:endParaRPr lang="en-US" dirty="0"/>
-          </a:p>
-        </p:txBody>
-      </p:sp>
-      <p:sp>
-        <p:nvSpPr>
-          <p:cNvPr id="66" name="Isosceles Triangle 65"/>
-          <p:cNvSpPr/>
-          <p:nvPr/>
-        </p:nvSpPr>
-        <p:spPr>
-          <a:xfrm flipV="1">
-            <a:off x="2069395" y="1192379"/>
-            <a:ext cx="350205" cy="71452"/>
-          </a:xfrm>
-          <a:prstGeom prst="triangle">
-            <a:avLst>
-              <a:gd name="adj" fmla="val 19834"/>
-            </a:avLst>
-          </a:prstGeom>
-          <a:solidFill>
-            <a:srgbClr val="FFC000"/>
-          </a:solidFill>
-          <a:ln>
-            <a:noFill/>
-          </a:ln>
-        </p:spPr>
-        <p:style>
-          <a:lnRef idx="2">
-            <a:schemeClr val="accent1">
-              <a:shade val="50000"/>
-            </a:schemeClr>
-          </a:lnRef>
-          <a:fillRef idx="1">
-            <a:schemeClr val="accent1"/>
-          </a:fillRef>
-          <a:effectRef idx="0">
-            <a:schemeClr val="accent1"/>
-          </a:effectRef>
-          <a:fontRef idx="minor">
-            <a:schemeClr val="lt1"/>
-          </a:fontRef>
-        </p:style>
-        <p:txBody>
-          <a:bodyPr rtlCol="0" anchor="ctr"/>
-          <a:lstStyle/>
-          <a:p>
-            <a:pPr algn="ctr"/>
-            <a:endParaRPr lang="en-US" dirty="0"/>
+            <a:endParaRPr lang="en-US"/>
           </a:p>
         </p:txBody>
       </p:sp>
     </p:spTree>
     <p:extLst>
       <p:ext uri="{BB962C8B-B14F-4D97-AF65-F5344CB8AC3E}">
-        <p14:creationId xmlns:p14="http://schemas.microsoft.com/office/powerpoint/2010/main" val="4132517028"/>
+        <p14:creationId xmlns:p14="http://schemas.microsoft.com/office/powerpoint/2010/main" val="2146354977"/>
       </p:ext>
     </p:extLst>
   </p:cSld>

</xml_diff>